<commit_message>
Folder Rename. Assembly notes updating.
</commit_message>
<xml_diff>
--- a/AssemblyNotes.pptx
+++ b/AssemblyNotes.pptx
@@ -4,11 +4,17 @@
   <p:sldMasterIdLst>
     <p:sldMasterId id="2147483648" r:id="rId1"/>
   </p:sldMasterIdLst>
+  <p:notesMasterIdLst>
+    <p:notesMasterId r:id="rId9"/>
+  </p:notesMasterIdLst>
   <p:sldIdLst>
     <p:sldId id="259" r:id="rId2"/>
     <p:sldId id="257" r:id="rId3"/>
     <p:sldId id="258" r:id="rId4"/>
-    <p:sldId id="260" r:id="rId5"/>
+    <p:sldId id="261" r:id="rId5"/>
+    <p:sldId id="262" r:id="rId6"/>
+    <p:sldId id="260" r:id="rId7"/>
+    <p:sldId id="264" r:id="rId8"/>
   </p:sldIdLst>
   <p:sldSz cx="12192000" cy="6858000"/>
   <p:notesSz cx="6858000" cy="9144000"/>
@@ -115,6 +121,355 @@
 </p:presentation>
 </file>
 
+<file path=ppt/notesMasters/notesMaster1.xml><?xml version="1.0" encoding="utf-8"?>
+<p:notesMaster xmlns:a="http://schemas.openxmlformats.org/drawingml/2006/main" xmlns:r="http://schemas.openxmlformats.org/officeDocument/2006/relationships" xmlns:p="http://schemas.openxmlformats.org/presentationml/2006/main">
+  <p:cSld>
+    <p:bg>
+      <p:bgRef idx="1001">
+        <a:schemeClr val="bg1"/>
+      </p:bgRef>
+    </p:bg>
+    <p:spTree>
+      <p:nvGrpSpPr>
+        <p:cNvPr id="1" name=""/>
+        <p:cNvGrpSpPr/>
+        <p:nvPr/>
+      </p:nvGrpSpPr>
+      <p:grpSpPr>
+        <a:xfrm>
+          <a:off x="0" y="0"/>
+          <a:ext cx="0" cy="0"/>
+          <a:chOff x="0" y="0"/>
+          <a:chExt cx="0" cy="0"/>
+        </a:xfrm>
+      </p:grpSpPr>
+      <p:sp>
+        <p:nvSpPr>
+          <p:cNvPr id="2" name="Header Placeholder 1"/>
+          <p:cNvSpPr>
+            <a:spLocks noGrp="1"/>
+          </p:cNvSpPr>
+          <p:nvPr>
+            <p:ph type="hdr" sz="quarter"/>
+          </p:nvPr>
+        </p:nvSpPr>
+        <p:spPr>
+          <a:xfrm>
+            <a:off x="0" y="0"/>
+            <a:ext cx="2971800" cy="458788"/>
+          </a:xfrm>
+          <a:prstGeom prst="rect">
+            <a:avLst/>
+          </a:prstGeom>
+        </p:spPr>
+        <p:txBody>
+          <a:bodyPr vert="horz" lIns="91440" tIns="45720" rIns="91440" bIns="45720" rtlCol="0"/>
+          <a:lstStyle>
+            <a:lvl1pPr algn="l">
+              <a:defRPr sz="1200"/>
+            </a:lvl1pPr>
+          </a:lstStyle>
+          <a:p>
+            <a:endParaRPr lang="en-US"/>
+          </a:p>
+        </p:txBody>
+      </p:sp>
+      <p:sp>
+        <p:nvSpPr>
+          <p:cNvPr id="3" name="Date Placeholder 2"/>
+          <p:cNvSpPr>
+            <a:spLocks noGrp="1"/>
+          </p:cNvSpPr>
+          <p:nvPr>
+            <p:ph type="dt" idx="1"/>
+          </p:nvPr>
+        </p:nvSpPr>
+        <p:spPr>
+          <a:xfrm>
+            <a:off x="3884613" y="0"/>
+            <a:ext cx="2971800" cy="458788"/>
+          </a:xfrm>
+          <a:prstGeom prst="rect">
+            <a:avLst/>
+          </a:prstGeom>
+        </p:spPr>
+        <p:txBody>
+          <a:bodyPr vert="horz" lIns="91440" tIns="45720" rIns="91440" bIns="45720" rtlCol="0"/>
+          <a:lstStyle>
+            <a:lvl1pPr algn="r">
+              <a:defRPr sz="1200"/>
+            </a:lvl1pPr>
+          </a:lstStyle>
+          <a:p>
+            <a:fld id="{3A80902D-B2A0-4631-9C91-BBC081EB1A92}" type="datetimeFigureOut">
+              <a:rPr lang="en-US" smtClean="0"/>
+              <a:t>1/1/2021</a:t>
+            </a:fld>
+            <a:endParaRPr lang="en-US"/>
+          </a:p>
+        </p:txBody>
+      </p:sp>
+      <p:sp>
+        <p:nvSpPr>
+          <p:cNvPr id="4" name="Slide Image Placeholder 3"/>
+          <p:cNvSpPr>
+            <a:spLocks noGrp="1" noRot="1" noChangeAspect="1"/>
+          </p:cNvSpPr>
+          <p:nvPr>
+            <p:ph type="sldImg" idx="2"/>
+          </p:nvPr>
+        </p:nvSpPr>
+        <p:spPr>
+          <a:xfrm>
+            <a:off x="685800" y="1143000"/>
+            <a:ext cx="5486400" cy="3086100"/>
+          </a:xfrm>
+          <a:prstGeom prst="rect">
+            <a:avLst/>
+          </a:prstGeom>
+          <a:noFill/>
+          <a:ln w="12700">
+            <a:solidFill>
+              <a:prstClr val="black"/>
+            </a:solidFill>
+          </a:ln>
+        </p:spPr>
+        <p:txBody>
+          <a:bodyPr vert="horz" lIns="91440" tIns="45720" rIns="91440" bIns="45720" rtlCol="0" anchor="ctr"/>
+          <a:lstStyle/>
+          <a:p>
+            <a:endParaRPr lang="en-US"/>
+          </a:p>
+        </p:txBody>
+      </p:sp>
+      <p:sp>
+        <p:nvSpPr>
+          <p:cNvPr id="5" name="Notes Placeholder 4"/>
+          <p:cNvSpPr>
+            <a:spLocks noGrp="1"/>
+          </p:cNvSpPr>
+          <p:nvPr>
+            <p:ph type="body" sz="quarter" idx="3"/>
+          </p:nvPr>
+        </p:nvSpPr>
+        <p:spPr>
+          <a:xfrm>
+            <a:off x="685800" y="4400550"/>
+            <a:ext cx="5486400" cy="3600450"/>
+          </a:xfrm>
+          <a:prstGeom prst="rect">
+            <a:avLst/>
+          </a:prstGeom>
+        </p:spPr>
+        <p:txBody>
+          <a:bodyPr vert="horz" lIns="91440" tIns="45720" rIns="91440" bIns="45720" rtlCol="0"/>
+          <a:lstStyle/>
+          <a:p>
+            <a:pPr lvl="0"/>
+            <a:r>
+              <a:rPr lang="en-US"/>
+              <a:t>Click to edit Master text styles</a:t>
+            </a:r>
+          </a:p>
+          <a:p>
+            <a:pPr lvl="1"/>
+            <a:r>
+              <a:rPr lang="en-US"/>
+              <a:t>Second level</a:t>
+            </a:r>
+          </a:p>
+          <a:p>
+            <a:pPr lvl="2"/>
+            <a:r>
+              <a:rPr lang="en-US"/>
+              <a:t>Third level</a:t>
+            </a:r>
+          </a:p>
+          <a:p>
+            <a:pPr lvl="3"/>
+            <a:r>
+              <a:rPr lang="en-US"/>
+              <a:t>Fourth level</a:t>
+            </a:r>
+          </a:p>
+          <a:p>
+            <a:pPr lvl="4"/>
+            <a:r>
+              <a:rPr lang="en-US"/>
+              <a:t>Fifth level</a:t>
+            </a:r>
+          </a:p>
+        </p:txBody>
+      </p:sp>
+      <p:sp>
+        <p:nvSpPr>
+          <p:cNvPr id="6" name="Footer Placeholder 5"/>
+          <p:cNvSpPr>
+            <a:spLocks noGrp="1"/>
+          </p:cNvSpPr>
+          <p:nvPr>
+            <p:ph type="ftr" sz="quarter" idx="4"/>
+          </p:nvPr>
+        </p:nvSpPr>
+        <p:spPr>
+          <a:xfrm>
+            <a:off x="0" y="8685213"/>
+            <a:ext cx="2971800" cy="458787"/>
+          </a:xfrm>
+          <a:prstGeom prst="rect">
+            <a:avLst/>
+          </a:prstGeom>
+        </p:spPr>
+        <p:txBody>
+          <a:bodyPr vert="horz" lIns="91440" tIns="45720" rIns="91440" bIns="45720" rtlCol="0" anchor="b"/>
+          <a:lstStyle>
+            <a:lvl1pPr algn="l">
+              <a:defRPr sz="1200"/>
+            </a:lvl1pPr>
+          </a:lstStyle>
+          <a:p>
+            <a:endParaRPr lang="en-US"/>
+          </a:p>
+        </p:txBody>
+      </p:sp>
+      <p:sp>
+        <p:nvSpPr>
+          <p:cNvPr id="7" name="Slide Number Placeholder 6"/>
+          <p:cNvSpPr>
+            <a:spLocks noGrp="1"/>
+          </p:cNvSpPr>
+          <p:nvPr>
+            <p:ph type="sldNum" sz="quarter" idx="5"/>
+          </p:nvPr>
+        </p:nvSpPr>
+        <p:spPr>
+          <a:xfrm>
+            <a:off x="3884613" y="8685213"/>
+            <a:ext cx="2971800" cy="458787"/>
+          </a:xfrm>
+          <a:prstGeom prst="rect">
+            <a:avLst/>
+          </a:prstGeom>
+        </p:spPr>
+        <p:txBody>
+          <a:bodyPr vert="horz" lIns="91440" tIns="45720" rIns="91440" bIns="45720" rtlCol="0" anchor="b"/>
+          <a:lstStyle>
+            <a:lvl1pPr algn="r">
+              <a:defRPr sz="1200"/>
+            </a:lvl1pPr>
+          </a:lstStyle>
+          <a:p>
+            <a:fld id="{9E05BDF4-56ED-4A33-83A3-7E4BA9BE28DC}" type="slidenum">
+              <a:rPr lang="en-US" smtClean="0"/>
+              <a:t>‹#›</a:t>
+            </a:fld>
+            <a:endParaRPr lang="en-US"/>
+          </a:p>
+        </p:txBody>
+      </p:sp>
+    </p:spTree>
+    <p:extLst>
+      <p:ext uri="{BB962C8B-B14F-4D97-AF65-F5344CB8AC3E}">
+        <p14:creationId xmlns:p14="http://schemas.microsoft.com/office/powerpoint/2010/main" val="306862062"/>
+      </p:ext>
+    </p:extLst>
+  </p:cSld>
+  <p:clrMap bg1="lt1" tx1="dk1" bg2="lt2" tx2="dk2" accent1="accent1" accent2="accent2" accent3="accent3" accent4="accent4" accent5="accent5" accent6="accent6" hlink="hlink" folHlink="folHlink"/>
+  <p:notesStyle>
+    <a:lvl1pPr marL="0" algn="l" defTabSz="914400" rtl="0" eaLnBrk="1" latinLnBrk="0" hangingPunct="1">
+      <a:defRPr sz="1200" kern="1200">
+        <a:solidFill>
+          <a:schemeClr val="tx1"/>
+        </a:solidFill>
+        <a:latin typeface="+mn-lt"/>
+        <a:ea typeface="+mn-ea"/>
+        <a:cs typeface="+mn-cs"/>
+      </a:defRPr>
+    </a:lvl1pPr>
+    <a:lvl2pPr marL="457200" algn="l" defTabSz="914400" rtl="0" eaLnBrk="1" latinLnBrk="0" hangingPunct="1">
+      <a:defRPr sz="1200" kern="1200">
+        <a:solidFill>
+          <a:schemeClr val="tx1"/>
+        </a:solidFill>
+        <a:latin typeface="+mn-lt"/>
+        <a:ea typeface="+mn-ea"/>
+        <a:cs typeface="+mn-cs"/>
+      </a:defRPr>
+    </a:lvl2pPr>
+    <a:lvl3pPr marL="914400" algn="l" defTabSz="914400" rtl="0" eaLnBrk="1" latinLnBrk="0" hangingPunct="1">
+      <a:defRPr sz="1200" kern="1200">
+        <a:solidFill>
+          <a:schemeClr val="tx1"/>
+        </a:solidFill>
+        <a:latin typeface="+mn-lt"/>
+        <a:ea typeface="+mn-ea"/>
+        <a:cs typeface="+mn-cs"/>
+      </a:defRPr>
+    </a:lvl3pPr>
+    <a:lvl4pPr marL="1371600" algn="l" defTabSz="914400" rtl="0" eaLnBrk="1" latinLnBrk="0" hangingPunct="1">
+      <a:defRPr sz="1200" kern="1200">
+        <a:solidFill>
+          <a:schemeClr val="tx1"/>
+        </a:solidFill>
+        <a:latin typeface="+mn-lt"/>
+        <a:ea typeface="+mn-ea"/>
+        <a:cs typeface="+mn-cs"/>
+      </a:defRPr>
+    </a:lvl4pPr>
+    <a:lvl5pPr marL="1828800" algn="l" defTabSz="914400" rtl="0" eaLnBrk="1" latinLnBrk="0" hangingPunct="1">
+      <a:defRPr sz="1200" kern="1200">
+        <a:solidFill>
+          <a:schemeClr val="tx1"/>
+        </a:solidFill>
+        <a:latin typeface="+mn-lt"/>
+        <a:ea typeface="+mn-ea"/>
+        <a:cs typeface="+mn-cs"/>
+      </a:defRPr>
+    </a:lvl5pPr>
+    <a:lvl6pPr marL="2286000" algn="l" defTabSz="914400" rtl="0" eaLnBrk="1" latinLnBrk="0" hangingPunct="1">
+      <a:defRPr sz="1200" kern="1200">
+        <a:solidFill>
+          <a:schemeClr val="tx1"/>
+        </a:solidFill>
+        <a:latin typeface="+mn-lt"/>
+        <a:ea typeface="+mn-ea"/>
+        <a:cs typeface="+mn-cs"/>
+      </a:defRPr>
+    </a:lvl6pPr>
+    <a:lvl7pPr marL="2743200" algn="l" defTabSz="914400" rtl="0" eaLnBrk="1" latinLnBrk="0" hangingPunct="1">
+      <a:defRPr sz="1200" kern="1200">
+        <a:solidFill>
+          <a:schemeClr val="tx1"/>
+        </a:solidFill>
+        <a:latin typeface="+mn-lt"/>
+        <a:ea typeface="+mn-ea"/>
+        <a:cs typeface="+mn-cs"/>
+      </a:defRPr>
+    </a:lvl7pPr>
+    <a:lvl8pPr marL="3200400" algn="l" defTabSz="914400" rtl="0" eaLnBrk="1" latinLnBrk="0" hangingPunct="1">
+      <a:defRPr sz="1200" kern="1200">
+        <a:solidFill>
+          <a:schemeClr val="tx1"/>
+        </a:solidFill>
+        <a:latin typeface="+mn-lt"/>
+        <a:ea typeface="+mn-ea"/>
+        <a:cs typeface="+mn-cs"/>
+      </a:defRPr>
+    </a:lvl8pPr>
+    <a:lvl9pPr marL="3657600" algn="l" defTabSz="914400" rtl="0" eaLnBrk="1" latinLnBrk="0" hangingPunct="1">
+      <a:defRPr sz="1200" kern="1200">
+        <a:solidFill>
+          <a:schemeClr val="tx1"/>
+        </a:solidFill>
+        <a:latin typeface="+mn-lt"/>
+        <a:ea typeface="+mn-ea"/>
+        <a:cs typeface="+mn-cs"/>
+      </a:defRPr>
+    </a:lvl9pPr>
+  </p:notesStyle>
+</p:notesMaster>
+</file>
+
 <file path=ppt/slideLayouts/slideLayout1.xml><?xml version="1.0" encoding="utf-8"?>
 <p:sldLayout xmlns:a="http://schemas.openxmlformats.org/drawingml/2006/main" xmlns:r="http://schemas.openxmlformats.org/officeDocument/2006/relationships" xmlns:p="http://schemas.openxmlformats.org/presentationml/2006/main" type="title" preserve="1">
   <p:cSld name="Title Slide">
@@ -262,7 +617,7 @@
           <a:p>
             <a:fld id="{4D49FE14-B3E8-4EFF-A154-D8A9C4641746}" type="datetimeFigureOut">
               <a:rPr lang="en-US" smtClean="0"/>
-              <a:t>12/29/2020</a:t>
+              <a:t>1/1/2021</a:t>
             </a:fld>
             <a:endParaRPr lang="en-US"/>
           </a:p>
@@ -460,7 +815,7 @@
           <a:p>
             <a:fld id="{4D49FE14-B3E8-4EFF-A154-D8A9C4641746}" type="datetimeFigureOut">
               <a:rPr lang="en-US" smtClean="0"/>
-              <a:t>12/29/2020</a:t>
+              <a:t>1/1/2021</a:t>
             </a:fld>
             <a:endParaRPr lang="en-US"/>
           </a:p>
@@ -668,7 +1023,7 @@
           <a:p>
             <a:fld id="{4D49FE14-B3E8-4EFF-A154-D8A9C4641746}" type="datetimeFigureOut">
               <a:rPr lang="en-US" smtClean="0"/>
-              <a:t>12/29/2020</a:t>
+              <a:t>1/1/2021</a:t>
             </a:fld>
             <a:endParaRPr lang="en-US"/>
           </a:p>
@@ -866,7 +1221,7 @@
           <a:p>
             <a:fld id="{4D49FE14-B3E8-4EFF-A154-D8A9C4641746}" type="datetimeFigureOut">
               <a:rPr lang="en-US" smtClean="0"/>
-              <a:t>12/29/2020</a:t>
+              <a:t>1/1/2021</a:t>
             </a:fld>
             <a:endParaRPr lang="en-US"/>
           </a:p>
@@ -1141,7 +1496,7 @@
           <a:p>
             <a:fld id="{4D49FE14-B3E8-4EFF-A154-D8A9C4641746}" type="datetimeFigureOut">
               <a:rPr lang="en-US" smtClean="0"/>
-              <a:t>12/29/2020</a:t>
+              <a:t>1/1/2021</a:t>
             </a:fld>
             <a:endParaRPr lang="en-US"/>
           </a:p>
@@ -1406,7 +1761,7 @@
           <a:p>
             <a:fld id="{4D49FE14-B3E8-4EFF-A154-D8A9C4641746}" type="datetimeFigureOut">
               <a:rPr lang="en-US" smtClean="0"/>
-              <a:t>12/29/2020</a:t>
+              <a:t>1/1/2021</a:t>
             </a:fld>
             <a:endParaRPr lang="en-US"/>
           </a:p>
@@ -1818,7 +2173,7 @@
           <a:p>
             <a:fld id="{4D49FE14-B3E8-4EFF-A154-D8A9C4641746}" type="datetimeFigureOut">
               <a:rPr lang="en-US" smtClean="0"/>
-              <a:t>12/29/2020</a:t>
+              <a:t>1/1/2021</a:t>
             </a:fld>
             <a:endParaRPr lang="en-US"/>
           </a:p>
@@ -1959,7 +2314,7 @@
           <a:p>
             <a:fld id="{4D49FE14-B3E8-4EFF-A154-D8A9C4641746}" type="datetimeFigureOut">
               <a:rPr lang="en-US" smtClean="0"/>
-              <a:t>12/29/2020</a:t>
+              <a:t>1/1/2021</a:t>
             </a:fld>
             <a:endParaRPr lang="en-US"/>
           </a:p>
@@ -2072,7 +2427,7 @@
           <a:p>
             <a:fld id="{4D49FE14-B3E8-4EFF-A154-D8A9C4641746}" type="datetimeFigureOut">
               <a:rPr lang="en-US" smtClean="0"/>
-              <a:t>12/29/2020</a:t>
+              <a:t>1/1/2021</a:t>
             </a:fld>
             <a:endParaRPr lang="en-US"/>
           </a:p>
@@ -2383,7 +2738,7 @@
           <a:p>
             <a:fld id="{4D49FE14-B3E8-4EFF-A154-D8A9C4641746}" type="datetimeFigureOut">
               <a:rPr lang="en-US" smtClean="0"/>
-              <a:t>12/29/2020</a:t>
+              <a:t>1/1/2021</a:t>
             </a:fld>
             <a:endParaRPr lang="en-US"/>
           </a:p>
@@ -2671,7 +3026,7 @@
           <a:p>
             <a:fld id="{4D49FE14-B3E8-4EFF-A154-D8A9C4641746}" type="datetimeFigureOut">
               <a:rPr lang="en-US" smtClean="0"/>
-              <a:t>12/29/2020</a:t>
+              <a:t>1/1/2021</a:t>
             </a:fld>
             <a:endParaRPr lang="en-US"/>
           </a:p>
@@ -2912,7 +3267,7 @@
           <a:p>
             <a:fld id="{4D49FE14-B3E8-4EFF-A154-D8A9C4641746}" type="datetimeFigureOut">
               <a:rPr lang="en-US" smtClean="0"/>
-              <a:t>12/29/2020</a:t>
+              <a:t>1/1/2021</a:t>
             </a:fld>
             <a:endParaRPr lang="en-US"/>
           </a:p>
@@ -9291,12 +9646,657 @@
           <a:chExt cx="0" cy="0"/>
         </a:xfrm>
       </p:grpSpPr>
+      <p:grpSp>
+        <p:nvGrpSpPr>
+          <p:cNvPr id="18" name="Group 17">
+            <a:extLst>
+              <a:ext uri="{FF2B5EF4-FFF2-40B4-BE49-F238E27FC236}">
+                <a16:creationId xmlns:a16="http://schemas.microsoft.com/office/drawing/2014/main" id="{3FD986DA-87C2-4F4A-A2CF-88315CE20FD7}"/>
+              </a:ext>
+            </a:extLst>
+          </p:cNvPr>
+          <p:cNvGrpSpPr/>
+          <p:nvPr/>
+        </p:nvGrpSpPr>
+        <p:grpSpPr>
+          <a:xfrm>
+            <a:off x="6735977" y="474502"/>
+            <a:ext cx="5203857" cy="6167534"/>
+            <a:chOff x="6735977" y="474502"/>
+            <a:chExt cx="5203857" cy="6167534"/>
+          </a:xfrm>
+        </p:grpSpPr>
+        <p:pic>
+          <p:nvPicPr>
+            <p:cNvPr id="8" name="Picture 7">
+              <a:extLst>
+                <a:ext uri="{FF2B5EF4-FFF2-40B4-BE49-F238E27FC236}">
+                  <a16:creationId xmlns:a16="http://schemas.microsoft.com/office/drawing/2014/main" id="{0FB71214-B6CB-4EBC-8F94-EF8EF075BAEF}"/>
+                </a:ext>
+              </a:extLst>
+            </p:cNvPr>
+            <p:cNvPicPr>
+              <a:picLocks noChangeAspect="1"/>
+            </p:cNvPicPr>
+            <p:nvPr/>
+          </p:nvPicPr>
+          <p:blipFill>
+            <a:blip r:embed="rId2">
+              <a:extLst>
+                <a:ext uri="{28A0092B-C50C-407E-A947-70E740481C1C}">
+                  <a14:useLocalDpi xmlns:a14="http://schemas.microsoft.com/office/drawing/2010/main" val="0"/>
+                </a:ext>
+              </a:extLst>
+            </a:blip>
+            <a:srcRect/>
+            <a:stretch/>
+          </p:blipFill>
+          <p:spPr>
+            <a:xfrm>
+              <a:off x="6735977" y="474502"/>
+              <a:ext cx="5203857" cy="6167534"/>
+            </a:xfrm>
+            <a:prstGeom prst="rect">
+              <a:avLst/>
+            </a:prstGeom>
+          </p:spPr>
+        </p:pic>
+        <p:sp>
+          <p:nvSpPr>
+            <p:cNvPr id="12" name="TextBox 11">
+              <a:extLst>
+                <a:ext uri="{FF2B5EF4-FFF2-40B4-BE49-F238E27FC236}">
+                  <a16:creationId xmlns:a16="http://schemas.microsoft.com/office/drawing/2014/main" id="{AAE4B94D-90E0-4BC3-A63D-71C9AB023395}"/>
+                </a:ext>
+              </a:extLst>
+            </p:cNvPr>
+            <p:cNvSpPr txBox="1"/>
+            <p:nvPr/>
+          </p:nvSpPr>
+          <p:spPr>
+            <a:xfrm>
+              <a:off x="10204959" y="2870207"/>
+              <a:ext cx="1148841" cy="276999"/>
+            </a:xfrm>
+            <a:prstGeom prst="rect">
+              <a:avLst/>
+            </a:prstGeom>
+            <a:noFill/>
+          </p:spPr>
+          <p:txBody>
+            <a:bodyPr wrap="none" rtlCol="0">
+              <a:spAutoFit/>
+            </a:bodyPr>
+            <a:lstStyle/>
+            <a:p>
+              <a:r>
+                <a:rPr lang="en-US" sz="1200" dirty="0"/>
+                <a:t>Outlet Vial Arm</a:t>
+              </a:r>
+            </a:p>
+          </p:txBody>
+        </p:sp>
+        <p:sp>
+          <p:nvSpPr>
+            <p:cNvPr id="13" name="TextBox 12">
+              <a:extLst>
+                <a:ext uri="{FF2B5EF4-FFF2-40B4-BE49-F238E27FC236}">
+                  <a16:creationId xmlns:a16="http://schemas.microsoft.com/office/drawing/2014/main" id="{476C07DC-5345-4134-9727-581247FB06D2}"/>
+                </a:ext>
+              </a:extLst>
+            </p:cNvPr>
+            <p:cNvSpPr txBox="1"/>
+            <p:nvPr/>
+          </p:nvSpPr>
+          <p:spPr>
+            <a:xfrm>
+              <a:off x="7143642" y="2205861"/>
+              <a:ext cx="1277081" cy="276999"/>
+            </a:xfrm>
+            <a:prstGeom prst="rect">
+              <a:avLst/>
+            </a:prstGeom>
+            <a:noFill/>
+          </p:spPr>
+          <p:txBody>
+            <a:bodyPr wrap="none" rtlCol="0">
+              <a:spAutoFit/>
+            </a:bodyPr>
+            <a:lstStyle/>
+            <a:p>
+              <a:r>
+                <a:rPr lang="en-US" sz="1200" dirty="0"/>
+                <a:t>Outlet Vial Clamp</a:t>
+              </a:r>
+            </a:p>
+          </p:txBody>
+        </p:sp>
+        <p:sp>
+          <p:nvSpPr>
+            <p:cNvPr id="14" name="TextBox 13">
+              <a:extLst>
+                <a:ext uri="{FF2B5EF4-FFF2-40B4-BE49-F238E27FC236}">
+                  <a16:creationId xmlns:a16="http://schemas.microsoft.com/office/drawing/2014/main" id="{F00EC1F3-BDEF-4660-8CE7-3B48EFE4799C}"/>
+                </a:ext>
+              </a:extLst>
+            </p:cNvPr>
+            <p:cNvSpPr txBox="1"/>
+            <p:nvPr/>
+          </p:nvSpPr>
+          <p:spPr>
+            <a:xfrm>
+              <a:off x="9515460" y="889406"/>
+              <a:ext cx="1913794" cy="276999"/>
+            </a:xfrm>
+            <a:prstGeom prst="rect">
+              <a:avLst/>
+            </a:prstGeom>
+            <a:noFill/>
+          </p:spPr>
+          <p:txBody>
+            <a:bodyPr wrap="none" rtlCol="0">
+              <a:spAutoFit/>
+            </a:bodyPr>
+            <a:lstStyle/>
+            <a:p>
+              <a:r>
+                <a:rPr lang="en-US" sz="1200" dirty="0"/>
+                <a:t>Lead Screw Smooth Bracket</a:t>
+              </a:r>
+            </a:p>
+          </p:txBody>
+        </p:sp>
+        <p:sp>
+          <p:nvSpPr>
+            <p:cNvPr id="15" name="TextBox 14">
+              <a:extLst>
+                <a:ext uri="{FF2B5EF4-FFF2-40B4-BE49-F238E27FC236}">
+                  <a16:creationId xmlns:a16="http://schemas.microsoft.com/office/drawing/2014/main" id="{9CC10811-BF28-4B24-B1EE-4D574B2B82E8}"/>
+                </a:ext>
+              </a:extLst>
+            </p:cNvPr>
+            <p:cNvSpPr txBox="1"/>
+            <p:nvPr/>
+          </p:nvSpPr>
+          <p:spPr>
+            <a:xfrm>
+              <a:off x="9739318" y="6106499"/>
+              <a:ext cx="1432123" cy="276999"/>
+            </a:xfrm>
+            <a:prstGeom prst="rect">
+              <a:avLst/>
+            </a:prstGeom>
+            <a:noFill/>
+          </p:spPr>
+          <p:txBody>
+            <a:bodyPr wrap="none" rtlCol="0">
+              <a:spAutoFit/>
+            </a:bodyPr>
+            <a:lstStyle/>
+            <a:p>
+              <a:r>
+                <a:rPr lang="en-US" sz="1200" dirty="0"/>
+                <a:t>Optical Post Bracket</a:t>
+              </a:r>
+            </a:p>
+          </p:txBody>
+        </p:sp>
+        <p:sp>
+          <p:nvSpPr>
+            <p:cNvPr id="16" name="TextBox 15">
+              <a:extLst>
+                <a:ext uri="{FF2B5EF4-FFF2-40B4-BE49-F238E27FC236}">
+                  <a16:creationId xmlns:a16="http://schemas.microsoft.com/office/drawing/2014/main" id="{C98E6D5F-96FE-4F25-888E-98ABEEFC527B}"/>
+                </a:ext>
+              </a:extLst>
+            </p:cNvPr>
+            <p:cNvSpPr txBox="1"/>
+            <p:nvPr/>
+          </p:nvSpPr>
+          <p:spPr>
+            <a:xfrm>
+              <a:off x="7955082" y="1317066"/>
+              <a:ext cx="939744" cy="276999"/>
+            </a:xfrm>
+            <a:prstGeom prst="rect">
+              <a:avLst/>
+            </a:prstGeom>
+            <a:noFill/>
+          </p:spPr>
+          <p:txBody>
+            <a:bodyPr wrap="none" rtlCol="0">
+              <a:spAutoFit/>
+            </a:bodyPr>
+            <a:lstStyle/>
+            <a:p>
+              <a:r>
+                <a:rPr lang="en-US" sz="1200" dirty="0"/>
+                <a:t>Limit Switch</a:t>
+              </a:r>
+            </a:p>
+          </p:txBody>
+        </p:sp>
+        <p:sp>
+          <p:nvSpPr>
+            <p:cNvPr id="17" name="TextBox 16">
+              <a:extLst>
+                <a:ext uri="{FF2B5EF4-FFF2-40B4-BE49-F238E27FC236}">
+                  <a16:creationId xmlns:a16="http://schemas.microsoft.com/office/drawing/2014/main" id="{0DAB094C-D8CD-4A52-983B-7389E44A1877}"/>
+                </a:ext>
+              </a:extLst>
+            </p:cNvPr>
+            <p:cNvSpPr txBox="1"/>
+            <p:nvPr/>
+          </p:nvSpPr>
+          <p:spPr>
+            <a:xfrm>
+              <a:off x="9997131" y="5202457"/>
+              <a:ext cx="1607363" cy="276999"/>
+            </a:xfrm>
+            <a:prstGeom prst="rect">
+              <a:avLst/>
+            </a:prstGeom>
+            <a:noFill/>
+          </p:spPr>
+          <p:txBody>
+            <a:bodyPr wrap="none" rtlCol="0">
+              <a:spAutoFit/>
+            </a:bodyPr>
+            <a:lstStyle/>
+            <a:p>
+              <a:r>
+                <a:rPr lang="en-US" sz="1200" dirty="0"/>
+                <a:t>Motor Smooth Bracket</a:t>
+              </a:r>
+            </a:p>
+          </p:txBody>
+        </p:sp>
+      </p:grpSp>
+      <p:graphicFrame>
+        <p:nvGraphicFramePr>
+          <p:cNvPr id="9" name="Table 31">
+            <a:extLst>
+              <a:ext uri="{FF2B5EF4-FFF2-40B4-BE49-F238E27FC236}">
+                <a16:creationId xmlns:a16="http://schemas.microsoft.com/office/drawing/2014/main" id="{E9ACA39F-2F80-43AC-A529-BAD3240B8A65}"/>
+              </a:ext>
+            </a:extLst>
+          </p:cNvPr>
+          <p:cNvGraphicFramePr>
+            <a:graphicFrameLocks noGrp="1"/>
+          </p:cNvGraphicFramePr>
+          <p:nvPr>
+            <p:extLst>
+              <p:ext uri="{D42A27DB-BD31-4B8C-83A1-F6EECF244321}">
+                <p14:modId xmlns:p14="http://schemas.microsoft.com/office/powerpoint/2010/main" val="2331147204"/>
+              </p:ext>
+            </p:extLst>
+          </p:nvPr>
+        </p:nvGraphicFramePr>
+        <p:xfrm>
+          <a:off x="412063" y="1455566"/>
+          <a:ext cx="6035391" cy="3383280"/>
+        </p:xfrm>
+        <a:graphic>
+          <a:graphicData uri="http://schemas.openxmlformats.org/drawingml/2006/table">
+            <a:tbl>
+              <a:tblPr firstRow="1" bandRow="1">
+                <a:tableStyleId>{073A0DAA-6AF3-43AB-8588-CEC1D06C72B9}</a:tableStyleId>
+              </a:tblPr>
+              <a:tblGrid>
+                <a:gridCol w="2011797">
+                  <a:extLst>
+                    <a:ext uri="{9D8B030D-6E8A-4147-A177-3AD203B41FA5}">
+                      <a16:colId xmlns:a16="http://schemas.microsoft.com/office/drawing/2014/main" val="582364631"/>
+                    </a:ext>
+                  </a:extLst>
+                </a:gridCol>
+                <a:gridCol w="2011797">
+                  <a:extLst>
+                    <a:ext uri="{9D8B030D-6E8A-4147-A177-3AD203B41FA5}">
+                      <a16:colId xmlns:a16="http://schemas.microsoft.com/office/drawing/2014/main" val="1897632321"/>
+                    </a:ext>
+                  </a:extLst>
+                </a:gridCol>
+                <a:gridCol w="2011797">
+                  <a:extLst>
+                    <a:ext uri="{9D8B030D-6E8A-4147-A177-3AD203B41FA5}">
+                      <a16:colId xmlns:a16="http://schemas.microsoft.com/office/drawing/2014/main" val="2830742079"/>
+                    </a:ext>
+                  </a:extLst>
+                </a:gridCol>
+              </a:tblGrid>
+              <a:tr h="270558">
+                <a:tc>
+                  <a:txBody>
+                    <a:bodyPr/>
+                    <a:lstStyle/>
+                    <a:p>
+                      <a:r>
+                        <a:rPr lang="en-US" dirty="0"/>
+                        <a:t>Object</a:t>
+                      </a:r>
+                    </a:p>
+                  </a:txBody>
+                  <a:tcPr/>
+                </a:tc>
+                <a:tc>
+                  <a:txBody>
+                    <a:bodyPr/>
+                    <a:lstStyle/>
+                    <a:p>
+                      <a:r>
+                        <a:rPr lang="en-US" dirty="0"/>
+                        <a:t>Material</a:t>
+                      </a:r>
+                    </a:p>
+                  </a:txBody>
+                  <a:tcPr/>
+                </a:tc>
+                <a:tc>
+                  <a:txBody>
+                    <a:bodyPr/>
+                    <a:lstStyle/>
+                    <a:p>
+                      <a:r>
+                        <a:rPr lang="en-US" dirty="0"/>
+                        <a:t>Fabrication</a:t>
+                      </a:r>
+                    </a:p>
+                  </a:txBody>
+                  <a:tcPr/>
+                </a:tc>
+                <a:extLst>
+                  <a:ext uri="{0D108BD9-81ED-4DB2-BD59-A6C34878D82A}">
+                    <a16:rowId xmlns:a16="http://schemas.microsoft.com/office/drawing/2014/main" val="499021770"/>
+                  </a:ext>
+                </a:extLst>
+              </a:tr>
+              <a:tr h="270558">
+                <a:tc>
+                  <a:txBody>
+                    <a:bodyPr/>
+                    <a:lstStyle/>
+                    <a:p>
+                      <a:r>
+                        <a:rPr lang="en-US" dirty="0"/>
+                        <a:t>Outlet Vial Arm</a:t>
+                      </a:r>
+                    </a:p>
+                  </a:txBody>
+                  <a:tcPr/>
+                </a:tc>
+                <a:tc>
+                  <a:txBody>
+                    <a:bodyPr/>
+                    <a:lstStyle/>
+                    <a:p>
+                      <a:r>
+                        <a:rPr lang="en-US" dirty="0"/>
+                        <a:t>PLA/PETG</a:t>
+                      </a:r>
+                    </a:p>
+                  </a:txBody>
+                  <a:tcPr/>
+                </a:tc>
+                <a:tc>
+                  <a:txBody>
+                    <a:bodyPr/>
+                    <a:lstStyle/>
+                    <a:p>
+                      <a:r>
+                        <a:rPr lang="en-US" dirty="0"/>
+                        <a:t>3D Print</a:t>
+                      </a:r>
+                    </a:p>
+                  </a:txBody>
+                  <a:tcPr/>
+                </a:tc>
+                <a:extLst>
+                  <a:ext uri="{0D108BD9-81ED-4DB2-BD59-A6C34878D82A}">
+                    <a16:rowId xmlns:a16="http://schemas.microsoft.com/office/drawing/2014/main" val="2999301715"/>
+                  </a:ext>
+                </a:extLst>
+              </a:tr>
+              <a:tr h="270558">
+                <a:tc>
+                  <a:txBody>
+                    <a:bodyPr/>
+                    <a:lstStyle/>
+                    <a:p>
+                      <a:r>
+                        <a:rPr lang="en-US" dirty="0"/>
+                        <a:t>Outlet Vial Clamp</a:t>
+                      </a:r>
+                    </a:p>
+                  </a:txBody>
+                  <a:tcPr/>
+                </a:tc>
+                <a:tc>
+                  <a:txBody>
+                    <a:bodyPr/>
+                    <a:lstStyle/>
+                    <a:p>
+                      <a:r>
+                        <a:rPr lang="en-US" dirty="0"/>
+                        <a:t>PLA/PETG</a:t>
+                      </a:r>
+                    </a:p>
+                  </a:txBody>
+                  <a:tcPr/>
+                </a:tc>
+                <a:tc>
+                  <a:txBody>
+                    <a:bodyPr/>
+                    <a:lstStyle/>
+                    <a:p>
+                      <a:r>
+                        <a:rPr lang="en-US" dirty="0"/>
+                        <a:t>3D Print</a:t>
+                      </a:r>
+                    </a:p>
+                  </a:txBody>
+                  <a:tcPr/>
+                </a:tc>
+                <a:extLst>
+                  <a:ext uri="{0D108BD9-81ED-4DB2-BD59-A6C34878D82A}">
+                    <a16:rowId xmlns:a16="http://schemas.microsoft.com/office/drawing/2014/main" val="3715225754"/>
+                  </a:ext>
+                </a:extLst>
+              </a:tr>
+              <a:tr h="270558">
+                <a:tc>
+                  <a:txBody>
+                    <a:bodyPr/>
+                    <a:lstStyle/>
+                    <a:p>
+                      <a:r>
+                        <a:rPr lang="en-US" dirty="0"/>
+                        <a:t>Lead Screw Smooth Bracket</a:t>
+                      </a:r>
+                    </a:p>
+                  </a:txBody>
+                  <a:tcPr/>
+                </a:tc>
+                <a:tc>
+                  <a:txBody>
+                    <a:bodyPr/>
+                    <a:lstStyle/>
+                    <a:p>
+                      <a:r>
+                        <a:rPr lang="en-US" dirty="0"/>
+                        <a:t>PLA/PETG</a:t>
+                      </a:r>
+                    </a:p>
+                  </a:txBody>
+                  <a:tcPr/>
+                </a:tc>
+                <a:tc>
+                  <a:txBody>
+                    <a:bodyPr/>
+                    <a:lstStyle/>
+                    <a:p>
+                      <a:r>
+                        <a:rPr lang="en-US" dirty="0"/>
+                        <a:t>3D Print</a:t>
+                      </a:r>
+                    </a:p>
+                  </a:txBody>
+                  <a:tcPr/>
+                </a:tc>
+                <a:extLst>
+                  <a:ext uri="{0D108BD9-81ED-4DB2-BD59-A6C34878D82A}">
+                    <a16:rowId xmlns:a16="http://schemas.microsoft.com/office/drawing/2014/main" val="60029695"/>
+                  </a:ext>
+                </a:extLst>
+              </a:tr>
+              <a:tr h="270558">
+                <a:tc>
+                  <a:txBody>
+                    <a:bodyPr/>
+                    <a:lstStyle/>
+                    <a:p>
+                      <a:r>
+                        <a:rPr lang="en-US" dirty="0"/>
+                        <a:t>Motor Smooth Bracket</a:t>
+                      </a:r>
+                    </a:p>
+                  </a:txBody>
+                  <a:tcPr/>
+                </a:tc>
+                <a:tc>
+                  <a:txBody>
+                    <a:bodyPr/>
+                    <a:lstStyle/>
+                    <a:p>
+                      <a:r>
+                        <a:rPr lang="en-US" dirty="0"/>
+                        <a:t>PLA/PETG</a:t>
+                      </a:r>
+                    </a:p>
+                  </a:txBody>
+                  <a:tcPr/>
+                </a:tc>
+                <a:tc>
+                  <a:txBody>
+                    <a:bodyPr/>
+                    <a:lstStyle/>
+                    <a:p>
+                      <a:r>
+                        <a:rPr lang="en-US" dirty="0"/>
+                        <a:t>3D Print</a:t>
+                      </a:r>
+                    </a:p>
+                  </a:txBody>
+                  <a:tcPr/>
+                </a:tc>
+                <a:extLst>
+                  <a:ext uri="{0D108BD9-81ED-4DB2-BD59-A6C34878D82A}">
+                    <a16:rowId xmlns:a16="http://schemas.microsoft.com/office/drawing/2014/main" val="1432546950"/>
+                  </a:ext>
+                </a:extLst>
+              </a:tr>
+              <a:tr h="270558">
+                <a:tc>
+                  <a:txBody>
+                    <a:bodyPr/>
+                    <a:lstStyle/>
+                    <a:p>
+                      <a:r>
+                        <a:rPr lang="en-US" dirty="0"/>
+                        <a:t>Optical Post Bracket</a:t>
+                      </a:r>
+                    </a:p>
+                  </a:txBody>
+                  <a:tcPr/>
+                </a:tc>
+                <a:tc>
+                  <a:txBody>
+                    <a:bodyPr/>
+                    <a:lstStyle/>
+                    <a:p>
+                      <a:r>
+                        <a:rPr lang="en-US" dirty="0"/>
+                        <a:t>PLA/PETG</a:t>
+                      </a:r>
+                    </a:p>
+                  </a:txBody>
+                  <a:tcPr/>
+                </a:tc>
+                <a:tc>
+                  <a:txBody>
+                    <a:bodyPr/>
+                    <a:lstStyle/>
+                    <a:p>
+                      <a:r>
+                        <a:rPr lang="en-US" dirty="0"/>
+                        <a:t>3D Print</a:t>
+                      </a:r>
+                    </a:p>
+                  </a:txBody>
+                  <a:tcPr/>
+                </a:tc>
+                <a:extLst>
+                  <a:ext uri="{0D108BD9-81ED-4DB2-BD59-A6C34878D82A}">
+                    <a16:rowId xmlns:a16="http://schemas.microsoft.com/office/drawing/2014/main" val="3165362387"/>
+                  </a:ext>
+                </a:extLst>
+              </a:tr>
+              <a:tr h="270558">
+                <a:tc>
+                  <a:txBody>
+                    <a:bodyPr/>
+                    <a:lstStyle/>
+                    <a:p>
+                      <a:r>
+                        <a:rPr lang="en-US" dirty="0"/>
+                        <a:t>Limit Switch</a:t>
+                      </a:r>
+                    </a:p>
+                  </a:txBody>
+                  <a:tcPr/>
+                </a:tc>
+                <a:tc>
+                  <a:txBody>
+                    <a:bodyPr/>
+                    <a:lstStyle/>
+                    <a:p>
+                      <a:r>
+                        <a:rPr lang="en-US" dirty="0"/>
+                        <a:t>Breadboard</a:t>
+                      </a:r>
+                    </a:p>
+                  </a:txBody>
+                  <a:tcPr/>
+                </a:tc>
+                <a:tc>
+                  <a:txBody>
+                    <a:bodyPr/>
+                    <a:lstStyle/>
+                    <a:p>
+                      <a:r>
+                        <a:rPr lang="en-US" dirty="0"/>
+                        <a:t>Snips/Scissors</a:t>
+                      </a:r>
+                    </a:p>
+                  </a:txBody>
+                  <a:tcPr/>
+                </a:tc>
+                <a:extLst>
+                  <a:ext uri="{0D108BD9-81ED-4DB2-BD59-A6C34878D82A}">
+                    <a16:rowId xmlns:a16="http://schemas.microsoft.com/office/drawing/2014/main" val="904980901"/>
+                  </a:ext>
+                </a:extLst>
+              </a:tr>
+            </a:tbl>
+          </a:graphicData>
+        </a:graphic>
+      </p:graphicFrame>
       <p:sp>
         <p:nvSpPr>
           <p:cNvPr id="2" name="Title 1">
             <a:extLst>
               <a:ext uri="{FF2B5EF4-FFF2-40B4-BE49-F238E27FC236}">
-                <a16:creationId xmlns:a16="http://schemas.microsoft.com/office/drawing/2014/main" id="{62C47C4A-C215-4599-B73E-5F560909F2A3}"/>
+                <a16:creationId xmlns:a16="http://schemas.microsoft.com/office/drawing/2014/main" id="{A7EFC57A-9D6F-49BA-A85B-8CBF23C10B16}"/>
               </a:ext>
             </a:extLst>
           </p:cNvPr>
@@ -9312,7 +10312,73 @@
           <a:bodyPr/>
           <a:lstStyle/>
           <a:p>
-            <a:endParaRPr lang="en-US"/>
+            <a:r>
+              <a:rPr lang="en-US" dirty="0"/>
+              <a:t>CE Outlet Assembly Custom Parts</a:t>
+            </a:r>
+          </a:p>
+        </p:txBody>
+      </p:sp>
+    </p:spTree>
+    <p:extLst>
+      <p:ext uri="{BB962C8B-B14F-4D97-AF65-F5344CB8AC3E}">
+        <p14:creationId xmlns:p14="http://schemas.microsoft.com/office/powerpoint/2010/main" val="4125271422"/>
+      </p:ext>
+    </p:extLst>
+  </p:cSld>
+  <p:clrMapOvr>
+    <a:masterClrMapping/>
+  </p:clrMapOvr>
+</p:sld>
+</file>
+
+<file path=ppt/slides/slide5.xml><?xml version="1.0" encoding="utf-8"?>
+<p:sld xmlns:a="http://schemas.openxmlformats.org/drawingml/2006/main" xmlns:r="http://schemas.openxmlformats.org/officeDocument/2006/relationships" xmlns:p="http://schemas.openxmlformats.org/presentationml/2006/main">
+  <p:cSld>
+    <p:spTree>
+      <p:nvGrpSpPr>
+        <p:cNvPr id="1" name=""/>
+        <p:cNvGrpSpPr/>
+        <p:nvPr/>
+      </p:nvGrpSpPr>
+      <p:grpSpPr>
+        <a:xfrm>
+          <a:off x="0" y="0"/>
+          <a:ext cx="0" cy="0"/>
+          <a:chOff x="0" y="0"/>
+          <a:chExt cx="0" cy="0"/>
+        </a:xfrm>
+      </p:grpSpPr>
+      <p:sp>
+        <p:nvSpPr>
+          <p:cNvPr id="2" name="Title 1">
+            <a:extLst>
+              <a:ext uri="{FF2B5EF4-FFF2-40B4-BE49-F238E27FC236}">
+                <a16:creationId xmlns:a16="http://schemas.microsoft.com/office/drawing/2014/main" id="{80DDCDF8-BFD8-4023-BCC8-C7AA50848D88}"/>
+              </a:ext>
+            </a:extLst>
+          </p:cNvPr>
+          <p:cNvSpPr>
+            <a:spLocks noGrp="1"/>
+          </p:cNvSpPr>
+          <p:nvPr>
+            <p:ph type="title"/>
+          </p:nvPr>
+        </p:nvSpPr>
+        <p:spPr>
+          <a:xfrm>
+            <a:off x="164975" y="119802"/>
+            <a:ext cx="6337041" cy="1325563"/>
+          </a:xfrm>
+        </p:spPr>
+        <p:txBody>
+          <a:bodyPr/>
+          <a:lstStyle/>
+          <a:p>
+            <a:r>
+              <a:rPr lang="en-US" dirty="0"/>
+              <a:t>CE Outlet Assembly Purchased Components</a:t>
+            </a:r>
           </a:p>
         </p:txBody>
       </p:sp>
@@ -9321,7 +10387,7 @@
           <p:cNvPr id="3" name="Content Placeholder 2">
             <a:extLst>
               <a:ext uri="{FF2B5EF4-FFF2-40B4-BE49-F238E27FC236}">
-                <a16:creationId xmlns:a16="http://schemas.microsoft.com/office/drawing/2014/main" id="{CEAC8F93-940C-491C-A384-41BFFC7738C6}"/>
+                <a16:creationId xmlns:a16="http://schemas.microsoft.com/office/drawing/2014/main" id="{156B4E93-3FE6-42D2-B66D-464615B341C2}"/>
               </a:ext>
             </a:extLst>
           </p:cNvPr>
@@ -9332,21 +10398,1068 @@
             <p:ph sz="half" idx="1"/>
           </p:nvPr>
         </p:nvSpPr>
-        <p:spPr/>
+        <p:spPr>
+          <a:xfrm>
+            <a:off x="124289" y="6165588"/>
+            <a:ext cx="5251880" cy="572610"/>
+          </a:xfrm>
+        </p:spPr>
         <p:txBody>
-          <a:bodyPr/>
+          <a:bodyPr>
+            <a:normAutofit/>
+          </a:bodyPr>
           <a:lstStyle/>
           <a:p>
-            <a:endParaRPr lang="en-US"/>
+            <a:pPr marL="0" indent="0">
+              <a:buNone/>
+            </a:pPr>
+            <a:r>
+              <a:rPr lang="en-US" sz="1600" dirty="0"/>
+              <a:t>* 8 mm lead on the lead screw and 1.8° step for the motor will not require adjusting the </a:t>
+            </a:r>
+            <a:r>
+              <a:rPr lang="en-US" sz="1600" dirty="0" err="1"/>
+              <a:t>OutletControl.ino</a:t>
+            </a:r>
+            <a:r>
+              <a:rPr lang="en-US" sz="1600" dirty="0"/>
+              <a:t> code. </a:t>
+            </a:r>
           </a:p>
         </p:txBody>
       </p:sp>
+      <p:pic>
+        <p:nvPicPr>
+          <p:cNvPr id="7" name="Content Placeholder 6">
+            <a:extLst>
+              <a:ext uri="{FF2B5EF4-FFF2-40B4-BE49-F238E27FC236}">
+                <a16:creationId xmlns:a16="http://schemas.microsoft.com/office/drawing/2014/main" id="{214AC2AF-F575-42DD-AFF2-E88C1CBDF673}"/>
+              </a:ext>
+            </a:extLst>
+          </p:cNvPr>
+          <p:cNvPicPr>
+            <a:picLocks noGrp="1" noChangeAspect="1"/>
+          </p:cNvPicPr>
+          <p:nvPr>
+            <p:ph sz="half" idx="2"/>
+          </p:nvPr>
+        </p:nvPicPr>
+        <p:blipFill>
+          <a:blip r:embed="rId2"/>
+          <a:stretch>
+            <a:fillRect/>
+          </a:stretch>
+        </p:blipFill>
+        <p:spPr>
+          <a:xfrm>
+            <a:off x="6667951" y="-543110"/>
+            <a:ext cx="5359074" cy="5797612"/>
+          </a:xfrm>
+        </p:spPr>
+      </p:pic>
+      <p:graphicFrame>
+        <p:nvGraphicFramePr>
+          <p:cNvPr id="5" name="Table 31">
+            <a:extLst>
+              <a:ext uri="{FF2B5EF4-FFF2-40B4-BE49-F238E27FC236}">
+                <a16:creationId xmlns:a16="http://schemas.microsoft.com/office/drawing/2014/main" id="{FCC2F971-3550-4039-8CD0-99EE25D3BEE9}"/>
+              </a:ext>
+            </a:extLst>
+          </p:cNvPr>
+          <p:cNvGraphicFramePr>
+            <a:graphicFrameLocks noGrp="1"/>
+          </p:cNvGraphicFramePr>
+          <p:nvPr>
+            <p:extLst>
+              <p:ext uri="{D42A27DB-BD31-4B8C-83A1-F6EECF244321}">
+                <p14:modId xmlns:p14="http://schemas.microsoft.com/office/powerpoint/2010/main" val="2304706684"/>
+              </p:ext>
+            </p:extLst>
+          </p:nvPr>
+        </p:nvGraphicFramePr>
+        <p:xfrm>
+          <a:off x="124289" y="1445365"/>
+          <a:ext cx="6134468" cy="4689589"/>
+        </p:xfrm>
+        <a:graphic>
+          <a:graphicData uri="http://schemas.openxmlformats.org/drawingml/2006/table">
+            <a:tbl>
+              <a:tblPr firstRow="1" bandRow="1">
+                <a:tableStyleId>{073A0DAA-6AF3-43AB-8588-CEC1D06C72B9}</a:tableStyleId>
+              </a:tblPr>
+              <a:tblGrid>
+                <a:gridCol w="1336221">
+                  <a:extLst>
+                    <a:ext uri="{9D8B030D-6E8A-4147-A177-3AD203B41FA5}">
+                      <a16:colId xmlns:a16="http://schemas.microsoft.com/office/drawing/2014/main" val="582364631"/>
+                    </a:ext>
+                  </a:extLst>
+                </a:gridCol>
+                <a:gridCol w="1188715">
+                  <a:extLst>
+                    <a:ext uri="{9D8B030D-6E8A-4147-A177-3AD203B41FA5}">
+                      <a16:colId xmlns:a16="http://schemas.microsoft.com/office/drawing/2014/main" val="2151374403"/>
+                    </a:ext>
+                  </a:extLst>
+                </a:gridCol>
+                <a:gridCol w="1379605">
+                  <a:extLst>
+                    <a:ext uri="{9D8B030D-6E8A-4147-A177-3AD203B41FA5}">
+                      <a16:colId xmlns:a16="http://schemas.microsoft.com/office/drawing/2014/main" val="1897632321"/>
+                    </a:ext>
+                  </a:extLst>
+                </a:gridCol>
+                <a:gridCol w="2229927">
+                  <a:extLst>
+                    <a:ext uri="{9D8B030D-6E8A-4147-A177-3AD203B41FA5}">
+                      <a16:colId xmlns:a16="http://schemas.microsoft.com/office/drawing/2014/main" val="2830742079"/>
+                    </a:ext>
+                  </a:extLst>
+                </a:gridCol>
+              </a:tblGrid>
+              <a:tr h="251452">
+                <a:tc>
+                  <a:txBody>
+                    <a:bodyPr/>
+                    <a:lstStyle/>
+                    <a:p>
+                      <a:r>
+                        <a:rPr lang="en-US" sz="1200" dirty="0"/>
+                        <a:t>Object</a:t>
+                      </a:r>
+                    </a:p>
+                  </a:txBody>
+                  <a:tcPr/>
+                </a:tc>
+                <a:tc>
+                  <a:txBody>
+                    <a:bodyPr/>
+                    <a:lstStyle/>
+                    <a:p>
+                      <a:r>
+                        <a:rPr lang="en-US" sz="1200" dirty="0"/>
+                        <a:t>P/N</a:t>
+                      </a:r>
+                    </a:p>
+                  </a:txBody>
+                  <a:tcPr/>
+                </a:tc>
+                <a:tc>
+                  <a:txBody>
+                    <a:bodyPr/>
+                    <a:lstStyle/>
+                    <a:p>
+                      <a:r>
+                        <a:rPr lang="en-US" sz="1200" dirty="0"/>
+                        <a:t>Supplier</a:t>
+                      </a:r>
+                    </a:p>
+                  </a:txBody>
+                  <a:tcPr/>
+                </a:tc>
+                <a:tc>
+                  <a:txBody>
+                    <a:bodyPr/>
+                    <a:lstStyle/>
+                    <a:p>
+                      <a:r>
+                        <a:rPr lang="en-US" sz="1200" dirty="0"/>
+                        <a:t>Notes</a:t>
+                      </a:r>
+                    </a:p>
+                  </a:txBody>
+                  <a:tcPr/>
+                </a:tc>
+                <a:extLst>
+                  <a:ext uri="{0D108BD9-81ED-4DB2-BD59-A6C34878D82A}">
+                    <a16:rowId xmlns:a16="http://schemas.microsoft.com/office/drawing/2014/main" val="499021770"/>
+                  </a:ext>
+                </a:extLst>
+              </a:tr>
+              <a:tr h="440041">
+                <a:tc>
+                  <a:txBody>
+                    <a:bodyPr/>
+                    <a:lstStyle/>
+                    <a:p>
+                      <a:r>
+                        <a:rPr lang="en-US" sz="1200" dirty="0"/>
+                        <a:t>2.54 mm Pitch Connectors</a:t>
+                      </a:r>
+                    </a:p>
+                  </a:txBody>
+                  <a:tcPr/>
+                </a:tc>
+                <a:tc>
+                  <a:txBody>
+                    <a:bodyPr/>
+                    <a:lstStyle/>
+                    <a:p>
+                      <a:r>
+                        <a:rPr lang="en-US" sz="1200" b="0" i="0" kern="1200" dirty="0">
+                          <a:solidFill>
+                            <a:schemeClr val="dk1"/>
+                          </a:solidFill>
+                          <a:effectLst/>
+                          <a:latin typeface="+mn-lt"/>
+                          <a:ea typeface="+mn-ea"/>
+                          <a:cs typeface="+mn-cs"/>
+                        </a:rPr>
+                        <a:t>HDB-635</a:t>
+                      </a:r>
+                      <a:endParaRPr lang="en-US" sz="1200" dirty="0"/>
+                    </a:p>
+                  </a:txBody>
+                  <a:tcPr/>
+                </a:tc>
+                <a:tc>
+                  <a:txBody>
+                    <a:bodyPr/>
+                    <a:lstStyle/>
+                    <a:p>
+                      <a:r>
+                        <a:rPr lang="en-US" sz="1200" dirty="0" err="1"/>
+                        <a:t>Hilitchi</a:t>
+                      </a:r>
+                      <a:r>
+                        <a:rPr lang="en-US" sz="1200" dirty="0"/>
+                        <a:t>, Amazon</a:t>
+                      </a:r>
+                    </a:p>
+                  </a:txBody>
+                  <a:tcPr/>
+                </a:tc>
+                <a:tc>
+                  <a:txBody>
+                    <a:bodyPr/>
+                    <a:lstStyle/>
+                    <a:p>
+                      <a:r>
+                        <a:rPr lang="en-US" sz="1200" dirty="0"/>
+                        <a:t>Any standard crimped 2.54 mm connectors</a:t>
+                      </a:r>
+                    </a:p>
+                  </a:txBody>
+                  <a:tcPr/>
+                </a:tc>
+                <a:extLst>
+                  <a:ext uri="{0D108BD9-81ED-4DB2-BD59-A6C34878D82A}">
+                    <a16:rowId xmlns:a16="http://schemas.microsoft.com/office/drawing/2014/main" val="2999301715"/>
+                  </a:ext>
+                </a:extLst>
+              </a:tr>
+              <a:tr h="440041">
+                <a:tc>
+                  <a:txBody>
+                    <a:bodyPr/>
+                    <a:lstStyle/>
+                    <a:p>
+                      <a:r>
+                        <a:rPr lang="en-US" sz="1200" dirty="0"/>
+                        <a:t>Limit Switch</a:t>
+                      </a:r>
+                    </a:p>
+                  </a:txBody>
+                  <a:tcPr/>
+                </a:tc>
+                <a:tc>
+                  <a:txBody>
+                    <a:bodyPr/>
+                    <a:lstStyle/>
+                    <a:p>
+                      <a:r>
+                        <a:rPr lang="en-US" sz="1200" b="0" i="0" kern="1200" dirty="0">
+                          <a:solidFill>
+                            <a:schemeClr val="dk1"/>
+                          </a:solidFill>
+                          <a:effectLst/>
+                          <a:latin typeface="+mn-lt"/>
+                          <a:ea typeface="+mn-ea"/>
+                          <a:cs typeface="+mn-cs"/>
+                        </a:rPr>
+                        <a:t>DBWDKG-FT01</a:t>
+                      </a:r>
+                      <a:endParaRPr lang="en-US" sz="1200" dirty="0"/>
+                    </a:p>
+                  </a:txBody>
+                  <a:tcPr/>
+                </a:tc>
+                <a:tc>
+                  <a:txBody>
+                    <a:bodyPr/>
+                    <a:lstStyle/>
+                    <a:p>
+                      <a:r>
+                        <a:rPr lang="en-US" sz="1200" dirty="0"/>
+                        <a:t>MUZHI, Amazon</a:t>
+                      </a:r>
+                    </a:p>
+                  </a:txBody>
+                  <a:tcPr/>
+                </a:tc>
+                <a:tc>
+                  <a:txBody>
+                    <a:bodyPr/>
+                    <a:lstStyle/>
+                    <a:p>
+                      <a:r>
+                        <a:rPr lang="en-US" sz="1200" dirty="0"/>
+                        <a:t>Any standard SPDT Switch</a:t>
+                      </a:r>
+                    </a:p>
+                  </a:txBody>
+                  <a:tcPr/>
+                </a:tc>
+                <a:extLst>
+                  <a:ext uri="{0D108BD9-81ED-4DB2-BD59-A6C34878D82A}">
+                    <a16:rowId xmlns:a16="http://schemas.microsoft.com/office/drawing/2014/main" val="3715225754"/>
+                  </a:ext>
+                </a:extLst>
+              </a:tr>
+              <a:tr h="440041">
+                <a:tc>
+                  <a:txBody>
+                    <a:bodyPr/>
+                    <a:lstStyle/>
+                    <a:p>
+                      <a:r>
+                        <a:rPr lang="en-US" sz="1200" dirty="0"/>
+                        <a:t>Lead Screw w/ Motor and nut</a:t>
+                      </a:r>
+                    </a:p>
+                  </a:txBody>
+                  <a:tcPr/>
+                </a:tc>
+                <a:tc>
+                  <a:txBody>
+                    <a:bodyPr/>
+                    <a:lstStyle/>
+                    <a:p>
+                      <a:pPr fontAlgn="t"/>
+                      <a:r>
+                        <a:rPr lang="en-US" sz="1200" dirty="0">
+                          <a:effectLst/>
+                        </a:rPr>
+                        <a:t>RDX3D060</a:t>
+                      </a:r>
+                    </a:p>
+                  </a:txBody>
+                  <a:tcPr marL="133350" marR="133350" marT="66675" marB="57150"/>
+                </a:tc>
+                <a:tc>
+                  <a:txBody>
+                    <a:bodyPr/>
+                    <a:lstStyle/>
+                    <a:p>
+                      <a:r>
+                        <a:rPr lang="en-US" sz="1200" dirty="0" err="1"/>
+                        <a:t>Redrex</a:t>
+                      </a:r>
+                      <a:r>
+                        <a:rPr lang="en-US" sz="1200" dirty="0"/>
+                        <a:t>, Amazon</a:t>
+                      </a:r>
+                    </a:p>
+                  </a:txBody>
+                  <a:tcPr/>
+                </a:tc>
+                <a:tc>
+                  <a:txBody>
+                    <a:bodyPr/>
+                    <a:lstStyle/>
+                    <a:p>
+                      <a:r>
+                        <a:rPr lang="en-US" sz="1200" dirty="0"/>
+                        <a:t>Any leadscrew + motor combo*</a:t>
+                      </a:r>
+                    </a:p>
+                  </a:txBody>
+                  <a:tcPr/>
+                </a:tc>
+                <a:extLst>
+                  <a:ext uri="{0D108BD9-81ED-4DB2-BD59-A6C34878D82A}">
+                    <a16:rowId xmlns:a16="http://schemas.microsoft.com/office/drawing/2014/main" val="60029695"/>
+                  </a:ext>
+                </a:extLst>
+              </a:tr>
+              <a:tr h="817220">
+                <a:tc>
+                  <a:txBody>
+                    <a:bodyPr/>
+                    <a:lstStyle/>
+                    <a:p>
+                      <a:r>
+                        <a:rPr lang="en-US" sz="1200" dirty="0"/>
+                        <a:t>Vial, Cap, and Septum</a:t>
+                      </a:r>
+                    </a:p>
+                  </a:txBody>
+                  <a:tcPr/>
+                </a:tc>
+                <a:tc>
+                  <a:txBody>
+                    <a:bodyPr/>
+                    <a:lstStyle/>
+                    <a:p>
+                      <a:r>
+                        <a:rPr lang="en-US" sz="1200" b="0" i="0" kern="1200" dirty="0">
+                          <a:solidFill>
+                            <a:schemeClr val="dk1"/>
+                          </a:solidFill>
+                          <a:effectLst/>
+                          <a:latin typeface="+mn-lt"/>
+                          <a:ea typeface="+mn-ea"/>
+                          <a:cs typeface="+mn-cs"/>
+                        </a:rPr>
+                        <a:t>27340</a:t>
+                      </a:r>
+                      <a:endParaRPr lang="en-US" sz="1200" dirty="0"/>
+                    </a:p>
+                  </a:txBody>
+                  <a:tcPr/>
+                </a:tc>
+                <a:tc>
+                  <a:txBody>
+                    <a:bodyPr/>
+                    <a:lstStyle/>
+                    <a:p>
+                      <a:r>
+                        <a:rPr lang="en-US" sz="1200" dirty="0" err="1"/>
+                        <a:t>MilliporeSigma</a:t>
+                      </a:r>
+                      <a:endParaRPr lang="en-US" sz="1200" dirty="0"/>
+                    </a:p>
+                  </a:txBody>
+                  <a:tcPr/>
+                </a:tc>
+                <a:tc>
+                  <a:txBody>
+                    <a:bodyPr/>
+                    <a:lstStyle/>
+                    <a:p>
+                      <a:r>
+                        <a:rPr lang="en-US" sz="1200" dirty="0"/>
+                        <a:t>Can be swapped with other 4 mL open top screw cap vials with PTFE/Silicon septum.</a:t>
+                      </a:r>
+                    </a:p>
+                  </a:txBody>
+                  <a:tcPr/>
+                </a:tc>
+                <a:extLst>
+                  <a:ext uri="{0D108BD9-81ED-4DB2-BD59-A6C34878D82A}">
+                    <a16:rowId xmlns:a16="http://schemas.microsoft.com/office/drawing/2014/main" val="1432546950"/>
+                  </a:ext>
+                </a:extLst>
+              </a:tr>
+              <a:tr h="414808">
+                <a:tc>
+                  <a:txBody>
+                    <a:bodyPr/>
+                    <a:lstStyle/>
+                    <a:p>
+                      <a:r>
+                        <a:rPr lang="en-US" sz="1200" dirty="0"/>
+                        <a:t>M3 Nylon Screw</a:t>
+                      </a:r>
+                    </a:p>
+                  </a:txBody>
+                  <a:tcPr/>
+                </a:tc>
+                <a:tc>
+                  <a:txBody>
+                    <a:bodyPr/>
+                    <a:lstStyle/>
+                    <a:p>
+                      <a:r>
+                        <a:rPr lang="en-US" sz="1200" dirty="0"/>
+                        <a:t>92492A721</a:t>
+                      </a:r>
+                    </a:p>
+                  </a:txBody>
+                  <a:tcPr/>
+                </a:tc>
+                <a:tc>
+                  <a:txBody>
+                    <a:bodyPr/>
+                    <a:lstStyle/>
+                    <a:p>
+                      <a:r>
+                        <a:rPr lang="en-US" sz="1200" dirty="0" err="1"/>
+                        <a:t>McMasterCarr</a:t>
+                      </a:r>
+                      <a:endParaRPr lang="en-US" sz="1200" dirty="0"/>
+                    </a:p>
+                  </a:txBody>
+                  <a:tcPr/>
+                </a:tc>
+                <a:tc>
+                  <a:txBody>
+                    <a:bodyPr/>
+                    <a:lstStyle/>
+                    <a:p>
+                      <a:r>
+                        <a:rPr lang="en-US" sz="1200" dirty="0"/>
+                        <a:t>16 mm L</a:t>
+                      </a:r>
+                    </a:p>
+                  </a:txBody>
+                  <a:tcPr/>
+                </a:tc>
+                <a:extLst>
+                  <a:ext uri="{0D108BD9-81ED-4DB2-BD59-A6C34878D82A}">
+                    <a16:rowId xmlns:a16="http://schemas.microsoft.com/office/drawing/2014/main" val="1203058026"/>
+                  </a:ext>
+                </a:extLst>
+              </a:tr>
+              <a:tr h="417601">
+                <a:tc>
+                  <a:txBody>
+                    <a:bodyPr/>
+                    <a:lstStyle/>
+                    <a:p>
+                      <a:r>
+                        <a:rPr lang="en-US" sz="1200" dirty="0"/>
+                        <a:t>M3 Screws + Hex Nuts</a:t>
+                      </a:r>
+                    </a:p>
+                  </a:txBody>
+                  <a:tcPr/>
+                </a:tc>
+                <a:tc>
+                  <a:txBody>
+                    <a:bodyPr/>
+                    <a:lstStyle/>
+                    <a:p>
+                      <a:r>
+                        <a:rPr lang="en-US" sz="1200" dirty="0"/>
+                        <a:t>M3-0420F-SS305</a:t>
+                      </a:r>
+                    </a:p>
+                  </a:txBody>
+                  <a:tcPr/>
+                </a:tc>
+                <a:tc>
+                  <a:txBody>
+                    <a:bodyPr/>
+                    <a:lstStyle/>
+                    <a:p>
+                      <a:r>
+                        <a:rPr lang="en-US" sz="1200" dirty="0" err="1"/>
+                        <a:t>Iexcell</a:t>
+                      </a:r>
+                      <a:r>
+                        <a:rPr lang="en-US" sz="1200" dirty="0"/>
+                        <a:t>, Amazon</a:t>
+                      </a:r>
+                    </a:p>
+                  </a:txBody>
+                  <a:tcPr/>
+                </a:tc>
+                <a:tc>
+                  <a:txBody>
+                    <a:bodyPr/>
+                    <a:lstStyle/>
+                    <a:p>
+                      <a:r>
+                        <a:rPr lang="en-US" sz="1200" dirty="0"/>
+                        <a:t>Generic assortment of lengths</a:t>
+                      </a:r>
+                    </a:p>
+                  </a:txBody>
+                  <a:tcPr/>
+                </a:tc>
+                <a:extLst>
+                  <a:ext uri="{0D108BD9-81ED-4DB2-BD59-A6C34878D82A}">
+                    <a16:rowId xmlns:a16="http://schemas.microsoft.com/office/drawing/2014/main" val="2316217207"/>
+                  </a:ext>
+                </a:extLst>
+              </a:tr>
+              <a:tr h="251452">
+                <a:tc>
+                  <a:txBody>
+                    <a:bodyPr/>
+                    <a:lstStyle/>
+                    <a:p>
+                      <a:r>
+                        <a:rPr lang="en-US" sz="1200" dirty="0"/>
+                        <a:t>Arduino Uno</a:t>
+                      </a:r>
+                    </a:p>
+                  </a:txBody>
+                  <a:tcPr/>
+                </a:tc>
+                <a:tc>
+                  <a:txBody>
+                    <a:bodyPr/>
+                    <a:lstStyle/>
+                    <a:p>
+                      <a:endParaRPr lang="en-US" sz="1200" dirty="0"/>
+                    </a:p>
+                  </a:txBody>
+                  <a:tcPr/>
+                </a:tc>
+                <a:tc>
+                  <a:txBody>
+                    <a:bodyPr/>
+                    <a:lstStyle/>
+                    <a:p>
+                      <a:r>
+                        <a:rPr lang="en-US" sz="1200" dirty="0"/>
+                        <a:t>Arduino</a:t>
+                      </a:r>
+                    </a:p>
+                  </a:txBody>
+                  <a:tcPr/>
+                </a:tc>
+                <a:tc>
+                  <a:txBody>
+                    <a:bodyPr/>
+                    <a:lstStyle/>
+                    <a:p>
+                      <a:endParaRPr lang="en-US" sz="1200" dirty="0"/>
+                    </a:p>
+                  </a:txBody>
+                  <a:tcPr/>
+                </a:tc>
+                <a:extLst>
+                  <a:ext uri="{0D108BD9-81ED-4DB2-BD59-A6C34878D82A}">
+                    <a16:rowId xmlns:a16="http://schemas.microsoft.com/office/drawing/2014/main" val="3165362387"/>
+                  </a:ext>
+                </a:extLst>
+              </a:tr>
+              <a:tr h="417601">
+                <a:tc>
+                  <a:txBody>
+                    <a:bodyPr/>
+                    <a:lstStyle/>
+                    <a:p>
+                      <a:r>
+                        <a:rPr lang="en-US" sz="1200" dirty="0"/>
+                        <a:t>PowerSTEP01</a:t>
+                      </a:r>
+                    </a:p>
+                  </a:txBody>
+                  <a:tcPr/>
+                </a:tc>
+                <a:tc>
+                  <a:txBody>
+                    <a:bodyPr/>
+                    <a:lstStyle/>
+                    <a:p>
+                      <a:r>
+                        <a:rPr lang="en-US" sz="1200" b="0" i="0" kern="1200" dirty="0">
+                          <a:solidFill>
+                            <a:schemeClr val="dk1"/>
+                          </a:solidFill>
+                          <a:effectLst/>
+                          <a:latin typeface="+mn-lt"/>
+                          <a:ea typeface="+mn-ea"/>
+                          <a:cs typeface="+mn-cs"/>
+                        </a:rPr>
+                        <a:t>X-NUCLEO-IHM03A1</a:t>
+                      </a:r>
+                      <a:endParaRPr lang="en-US" sz="1200" dirty="0"/>
+                    </a:p>
+                  </a:txBody>
+                  <a:tcPr/>
+                </a:tc>
+                <a:tc>
+                  <a:txBody>
+                    <a:bodyPr/>
+                    <a:lstStyle/>
+                    <a:p>
+                      <a:r>
+                        <a:rPr lang="en-US" sz="1200" dirty="0"/>
+                        <a:t>Mouser</a:t>
+                      </a:r>
+                    </a:p>
+                  </a:txBody>
+                  <a:tcPr/>
+                </a:tc>
+                <a:tc>
+                  <a:txBody>
+                    <a:bodyPr/>
+                    <a:lstStyle/>
+                    <a:p>
+                      <a:endParaRPr lang="en-US" sz="1200" dirty="0"/>
+                    </a:p>
+                  </a:txBody>
+                  <a:tcPr/>
+                </a:tc>
+                <a:extLst>
+                  <a:ext uri="{0D108BD9-81ED-4DB2-BD59-A6C34878D82A}">
+                    <a16:rowId xmlns:a16="http://schemas.microsoft.com/office/drawing/2014/main" val="904980901"/>
+                  </a:ext>
+                </a:extLst>
+              </a:tr>
+              <a:tr h="584642">
+                <a:tc>
+                  <a:txBody>
+                    <a:bodyPr/>
+                    <a:lstStyle/>
+                    <a:p>
+                      <a:r>
+                        <a:rPr lang="en-US" sz="1200" dirty="0"/>
+                        <a:t>12 V Power Supply</a:t>
+                      </a:r>
+                    </a:p>
+                  </a:txBody>
+                  <a:tcPr/>
+                </a:tc>
+                <a:tc>
+                  <a:txBody>
+                    <a:bodyPr/>
+                    <a:lstStyle/>
+                    <a:p>
+                      <a:endParaRPr lang="en-US" sz="1200" dirty="0"/>
+                    </a:p>
+                  </a:txBody>
+                  <a:tcPr/>
+                </a:tc>
+                <a:tc>
+                  <a:txBody>
+                    <a:bodyPr/>
+                    <a:lstStyle/>
+                    <a:p>
+                      <a:r>
+                        <a:rPr lang="en-US" sz="1200" dirty="0" err="1"/>
+                        <a:t>SmoTecQ</a:t>
+                      </a:r>
+                      <a:r>
+                        <a:rPr lang="en-US" sz="1200" dirty="0"/>
+                        <a:t>, Amazon</a:t>
+                      </a:r>
+                    </a:p>
+                  </a:txBody>
+                  <a:tcPr/>
+                </a:tc>
+                <a:tc>
+                  <a:txBody>
+                    <a:bodyPr/>
+                    <a:lstStyle/>
+                    <a:p>
+                      <a:r>
+                        <a:rPr lang="en-US" sz="1200" dirty="0"/>
+                        <a:t>The driver can power 12-48V so choose a power supply suitable for your motor. </a:t>
+                      </a:r>
+                    </a:p>
+                  </a:txBody>
+                  <a:tcPr/>
+                </a:tc>
+                <a:extLst>
+                  <a:ext uri="{0D108BD9-81ED-4DB2-BD59-A6C34878D82A}">
+                    <a16:rowId xmlns:a16="http://schemas.microsoft.com/office/drawing/2014/main" val="348170188"/>
+                  </a:ext>
+                </a:extLst>
+              </a:tr>
+            </a:tbl>
+          </a:graphicData>
+        </a:graphic>
+      </p:graphicFrame>
+      <p:grpSp>
+        <p:nvGrpSpPr>
+          <p:cNvPr id="14" name="Group 13">
+            <a:extLst>
+              <a:ext uri="{FF2B5EF4-FFF2-40B4-BE49-F238E27FC236}">
+                <a16:creationId xmlns:a16="http://schemas.microsoft.com/office/drawing/2014/main" id="{BC0237B4-9253-42C2-B89E-2B92F62033A9}"/>
+              </a:ext>
+            </a:extLst>
+          </p:cNvPr>
+          <p:cNvGrpSpPr/>
+          <p:nvPr/>
+        </p:nvGrpSpPr>
+        <p:grpSpPr>
+          <a:xfrm>
+            <a:off x="7371049" y="385671"/>
+            <a:ext cx="2312475" cy="4868831"/>
+            <a:chOff x="7305869" y="1690688"/>
+            <a:chExt cx="2312475" cy="4868831"/>
+          </a:xfrm>
+        </p:grpSpPr>
+        <p:sp>
+          <p:nvSpPr>
+            <p:cNvPr id="8" name="TextBox 7">
+              <a:extLst>
+                <a:ext uri="{FF2B5EF4-FFF2-40B4-BE49-F238E27FC236}">
+                  <a16:creationId xmlns:a16="http://schemas.microsoft.com/office/drawing/2014/main" id="{31BA9410-7DE4-45AA-A826-2807DAE8C349}"/>
+                </a:ext>
+              </a:extLst>
+            </p:cNvPr>
+            <p:cNvSpPr txBox="1"/>
+            <p:nvPr/>
+          </p:nvSpPr>
+          <p:spPr>
+            <a:xfrm>
+              <a:off x="7305869" y="3987090"/>
+              <a:ext cx="628698" cy="261610"/>
+            </a:xfrm>
+            <a:prstGeom prst="rect">
+              <a:avLst/>
+            </a:prstGeom>
+            <a:noFill/>
+          </p:spPr>
+          <p:txBody>
+            <a:bodyPr wrap="none" rtlCol="0">
+              <a:spAutoFit/>
+            </a:bodyPr>
+            <a:lstStyle/>
+            <a:p>
+              <a:r>
+                <a:rPr lang="en-US" sz="1100" dirty="0"/>
+                <a:t>Vial cap</a:t>
+              </a:r>
+            </a:p>
+          </p:txBody>
+        </p:sp>
+        <p:sp>
+          <p:nvSpPr>
+            <p:cNvPr id="9" name="TextBox 8">
+              <a:extLst>
+                <a:ext uri="{FF2B5EF4-FFF2-40B4-BE49-F238E27FC236}">
+                  <a16:creationId xmlns:a16="http://schemas.microsoft.com/office/drawing/2014/main" id="{24346F9C-08AB-40AD-9836-0CB6D7BA1C06}"/>
+                </a:ext>
+              </a:extLst>
+            </p:cNvPr>
+            <p:cNvSpPr txBox="1"/>
+            <p:nvPr/>
+          </p:nvSpPr>
+          <p:spPr>
+            <a:xfrm>
+              <a:off x="7383624" y="3614336"/>
+              <a:ext cx="625492" cy="261610"/>
+            </a:xfrm>
+            <a:prstGeom prst="rect">
+              <a:avLst/>
+            </a:prstGeom>
+            <a:noFill/>
+          </p:spPr>
+          <p:txBody>
+            <a:bodyPr wrap="none" rtlCol="0">
+              <a:spAutoFit/>
+            </a:bodyPr>
+            <a:lstStyle/>
+            <a:p>
+              <a:r>
+                <a:rPr lang="en-US" sz="1100" dirty="0" err="1"/>
+                <a:t>Setpum</a:t>
+              </a:r>
+              <a:endParaRPr lang="en-US" sz="1100" dirty="0"/>
+            </a:p>
+          </p:txBody>
+        </p:sp>
+        <p:sp>
+          <p:nvSpPr>
+            <p:cNvPr id="10" name="TextBox 9">
+              <a:extLst>
+                <a:ext uri="{FF2B5EF4-FFF2-40B4-BE49-F238E27FC236}">
+                  <a16:creationId xmlns:a16="http://schemas.microsoft.com/office/drawing/2014/main" id="{F854BDB4-6270-43D3-A9E4-C34BB8596442}"/>
+                </a:ext>
+              </a:extLst>
+            </p:cNvPr>
+            <p:cNvSpPr txBox="1"/>
+            <p:nvPr/>
+          </p:nvSpPr>
+          <p:spPr>
+            <a:xfrm>
+              <a:off x="8198498" y="5573710"/>
+              <a:ext cx="396262" cy="261610"/>
+            </a:xfrm>
+            <a:prstGeom prst="rect">
+              <a:avLst/>
+            </a:prstGeom>
+            <a:noFill/>
+          </p:spPr>
+          <p:txBody>
+            <a:bodyPr wrap="none" rtlCol="0">
+              <a:spAutoFit/>
+            </a:bodyPr>
+            <a:lstStyle/>
+            <a:p>
+              <a:r>
+                <a:rPr lang="en-US" sz="1100" dirty="0"/>
+                <a:t>Vial</a:t>
+              </a:r>
+            </a:p>
+          </p:txBody>
+        </p:sp>
+        <p:sp>
+          <p:nvSpPr>
+            <p:cNvPr id="11" name="TextBox 10">
+              <a:extLst>
+                <a:ext uri="{FF2B5EF4-FFF2-40B4-BE49-F238E27FC236}">
+                  <a16:creationId xmlns:a16="http://schemas.microsoft.com/office/drawing/2014/main" id="{7543012A-3763-4D98-A053-3BBA96ACEB59}"/>
+                </a:ext>
+              </a:extLst>
+            </p:cNvPr>
+            <p:cNvSpPr txBox="1"/>
+            <p:nvPr/>
+          </p:nvSpPr>
+          <p:spPr>
+            <a:xfrm>
+              <a:off x="8742783" y="2479057"/>
+              <a:ext cx="875561" cy="261610"/>
+            </a:xfrm>
+            <a:prstGeom prst="rect">
+              <a:avLst/>
+            </a:prstGeom>
+            <a:noFill/>
+          </p:spPr>
+          <p:txBody>
+            <a:bodyPr wrap="none" rtlCol="0">
+              <a:spAutoFit/>
+            </a:bodyPr>
+            <a:lstStyle/>
+            <a:p>
+              <a:r>
+                <a:rPr lang="en-US" sz="1100" dirty="0"/>
+                <a:t>Limit Switch</a:t>
+              </a:r>
+            </a:p>
+          </p:txBody>
+        </p:sp>
+        <p:sp>
+          <p:nvSpPr>
+            <p:cNvPr id="12" name="TextBox 11">
+              <a:extLst>
+                <a:ext uri="{FF2B5EF4-FFF2-40B4-BE49-F238E27FC236}">
+                  <a16:creationId xmlns:a16="http://schemas.microsoft.com/office/drawing/2014/main" id="{904C0BE7-8370-4F2D-999C-4516EB9CF123}"/>
+                </a:ext>
+              </a:extLst>
+            </p:cNvPr>
+            <p:cNvSpPr txBox="1"/>
+            <p:nvPr/>
+          </p:nvSpPr>
+          <p:spPr>
+            <a:xfrm>
+              <a:off x="8188781" y="1690688"/>
+              <a:ext cx="861133" cy="261610"/>
+            </a:xfrm>
+            <a:prstGeom prst="rect">
+              <a:avLst/>
+            </a:prstGeom>
+            <a:noFill/>
+          </p:spPr>
+          <p:txBody>
+            <a:bodyPr wrap="none" rtlCol="0">
+              <a:spAutoFit/>
+            </a:bodyPr>
+            <a:lstStyle/>
+            <a:p>
+              <a:r>
+                <a:rPr lang="en-US" sz="1100" dirty="0"/>
+                <a:t>Breadboard</a:t>
+              </a:r>
+            </a:p>
+          </p:txBody>
+        </p:sp>
+        <p:sp>
+          <p:nvSpPr>
+            <p:cNvPr id="13" name="TextBox 12">
+              <a:extLst>
+                <a:ext uri="{FF2B5EF4-FFF2-40B4-BE49-F238E27FC236}">
+                  <a16:creationId xmlns:a16="http://schemas.microsoft.com/office/drawing/2014/main" id="{5C305358-1977-46C3-8F17-5F639FEB2F96}"/>
+                </a:ext>
+              </a:extLst>
+            </p:cNvPr>
+            <p:cNvSpPr txBox="1"/>
+            <p:nvPr/>
+          </p:nvSpPr>
+          <p:spPr>
+            <a:xfrm>
+              <a:off x="8742783" y="6297909"/>
+              <a:ext cx="800219" cy="261610"/>
+            </a:xfrm>
+            <a:prstGeom prst="rect">
+              <a:avLst/>
+            </a:prstGeom>
+            <a:noFill/>
+          </p:spPr>
+          <p:txBody>
+            <a:bodyPr wrap="none" rtlCol="0">
+              <a:spAutoFit/>
+            </a:bodyPr>
+            <a:lstStyle/>
+            <a:p>
+              <a:r>
+                <a:rPr lang="en-US" sz="1100" dirty="0" err="1"/>
+                <a:t>LeadScrew</a:t>
+              </a:r>
+              <a:endParaRPr lang="en-US" sz="1100" dirty="0"/>
+            </a:p>
+          </p:txBody>
+        </p:sp>
+      </p:grpSp>
       <p:sp>
         <p:nvSpPr>
-          <p:cNvPr id="4" name="Content Placeholder 3">
-            <a:extLst>
-              <a:ext uri="{FF2B5EF4-FFF2-40B4-BE49-F238E27FC236}">
-                <a16:creationId xmlns:a16="http://schemas.microsoft.com/office/drawing/2014/main" id="{EE958C90-4377-4ADB-A773-BC0FD1B9A0E3}"/>
+          <p:cNvPr id="15" name="TextBox 14">
+            <a:extLst>
+              <a:ext uri="{FF2B5EF4-FFF2-40B4-BE49-F238E27FC236}">
+                <a16:creationId xmlns:a16="http://schemas.microsoft.com/office/drawing/2014/main" id="{E0F84329-6C6F-40B1-9995-9D1D0763D98C}"/>
+              </a:ext>
+            </a:extLst>
+          </p:cNvPr>
+          <p:cNvSpPr txBox="1"/>
+          <p:nvPr/>
+        </p:nvSpPr>
+        <p:spPr>
+          <a:xfrm>
+            <a:off x="7714041" y="5360918"/>
+            <a:ext cx="3788281" cy="369332"/>
+          </a:xfrm>
+          <a:prstGeom prst="rect">
+            <a:avLst/>
+          </a:prstGeom>
+          <a:noFill/>
+        </p:spPr>
+        <p:txBody>
+          <a:bodyPr wrap="none" rtlCol="0">
+            <a:spAutoFit/>
+          </a:bodyPr>
+          <a:lstStyle/>
+          <a:p>
+            <a:r>
+              <a:rPr lang="en-US" dirty="0"/>
+              <a:t>Exploded view of the outlet assembly.</a:t>
+            </a:r>
+          </a:p>
+        </p:txBody>
+      </p:sp>
+    </p:spTree>
+    <p:extLst>
+      <p:ext uri="{BB962C8B-B14F-4D97-AF65-F5344CB8AC3E}">
+        <p14:creationId xmlns:p14="http://schemas.microsoft.com/office/powerpoint/2010/main" val="2575816002"/>
+      </p:ext>
+    </p:extLst>
+  </p:cSld>
+  <p:clrMapOvr>
+    <a:masterClrMapping/>
+  </p:clrMapOvr>
+</p:sld>
+</file>
+
+<file path=ppt/slides/slide6.xml><?xml version="1.0" encoding="utf-8"?>
+<p:sld xmlns:a="http://schemas.openxmlformats.org/drawingml/2006/main" xmlns:r="http://schemas.openxmlformats.org/officeDocument/2006/relationships" xmlns:p="http://schemas.openxmlformats.org/presentationml/2006/main">
+  <p:cSld>
+    <p:spTree>
+      <p:nvGrpSpPr>
+        <p:cNvPr id="1" name=""/>
+        <p:cNvGrpSpPr/>
+        <p:nvPr/>
+      </p:nvGrpSpPr>
+      <p:grpSpPr>
+        <a:xfrm>
+          <a:off x="0" y="0"/>
+          <a:ext cx="0" cy="0"/>
+          <a:chOff x="0" y="0"/>
+          <a:chExt cx="0" cy="0"/>
+        </a:xfrm>
+      </p:grpSpPr>
+      <p:sp>
+        <p:nvSpPr>
+          <p:cNvPr id="2" name="Title 1">
+            <a:extLst>
+              <a:ext uri="{FF2B5EF4-FFF2-40B4-BE49-F238E27FC236}">
+                <a16:creationId xmlns:a16="http://schemas.microsoft.com/office/drawing/2014/main" id="{62C47C4A-C215-4599-B73E-5F560909F2A3}"/>
               </a:ext>
             </a:extLst>
           </p:cNvPr>
@@ -9354,7 +11467,7 @@
             <a:spLocks noGrp="1"/>
           </p:cNvSpPr>
           <p:nvPr>
-            <p:ph sz="half" idx="2"/>
+            <p:ph type="title"/>
           </p:nvPr>
         </p:nvSpPr>
         <p:spPr/>
@@ -9362,7 +11475,193 @@
           <a:bodyPr/>
           <a:lstStyle/>
           <a:p>
-            <a:endParaRPr lang="en-US"/>
+            <a:r>
+              <a:rPr lang="en-US" dirty="0"/>
+              <a:t>Limit Switch for Outlet</a:t>
+            </a:r>
+          </a:p>
+        </p:txBody>
+      </p:sp>
+      <p:sp>
+        <p:nvSpPr>
+          <p:cNvPr id="3" name="Content Placeholder 2">
+            <a:extLst>
+              <a:ext uri="{FF2B5EF4-FFF2-40B4-BE49-F238E27FC236}">
+                <a16:creationId xmlns:a16="http://schemas.microsoft.com/office/drawing/2014/main" id="{CEAC8F93-940C-491C-A384-41BFFC7738C6}"/>
+              </a:ext>
+            </a:extLst>
+          </p:cNvPr>
+          <p:cNvSpPr>
+            <a:spLocks noGrp="1"/>
+          </p:cNvSpPr>
+          <p:nvPr>
+            <p:ph sz="half" idx="1"/>
+          </p:nvPr>
+        </p:nvSpPr>
+        <p:spPr>
+          <a:xfrm>
+            <a:off x="838200" y="1825625"/>
+            <a:ext cx="5181600" cy="2065240"/>
+          </a:xfrm>
+        </p:spPr>
+        <p:txBody>
+          <a:bodyPr>
+            <a:normAutofit fontScale="62500" lnSpcReduction="20000"/>
+          </a:bodyPr>
+          <a:lstStyle/>
+          <a:p>
+            <a:r>
+              <a:rPr lang="en-US" dirty="0"/>
+              <a:t>Simple through hole bread board can be used. </a:t>
+            </a:r>
+          </a:p>
+          <a:p>
+            <a:r>
+              <a:rPr lang="en-US" dirty="0"/>
+              <a:t>Most generic single pull double throw (SPDT) limit switches will work.</a:t>
+            </a:r>
+          </a:p>
+          <a:p>
+            <a:r>
+              <a:rPr lang="en-US" dirty="0"/>
+              <a:t>Breadboard can be cut with box cutters or snips. To rough dimensions specified.</a:t>
+            </a:r>
+          </a:p>
+          <a:p>
+            <a:r>
+              <a:rPr lang="en-US" dirty="0"/>
+              <a:t>Breadboard will  need to have two holes drilled for 3M mounting spaced 35 mm apart, 3.1mm diameter.</a:t>
+            </a:r>
+          </a:p>
+        </p:txBody>
+      </p:sp>
+      <p:pic>
+        <p:nvPicPr>
+          <p:cNvPr id="10" name="Picture 9">
+            <a:extLst>
+              <a:ext uri="{FF2B5EF4-FFF2-40B4-BE49-F238E27FC236}">
+                <a16:creationId xmlns:a16="http://schemas.microsoft.com/office/drawing/2014/main" id="{E8F69728-B373-4CE4-B8BC-360803EE7A5D}"/>
+              </a:ext>
+            </a:extLst>
+          </p:cNvPr>
+          <p:cNvPicPr>
+            <a:picLocks noChangeAspect="1"/>
+          </p:cNvPicPr>
+          <p:nvPr/>
+        </p:nvPicPr>
+        <p:blipFill>
+          <a:blip r:embed="rId2"/>
+          <a:stretch>
+            <a:fillRect/>
+          </a:stretch>
+        </p:blipFill>
+        <p:spPr>
+          <a:xfrm>
+            <a:off x="7986577" y="133706"/>
+            <a:ext cx="3188020" cy="2916173"/>
+          </a:xfrm>
+          <a:prstGeom prst="rect">
+            <a:avLst/>
+          </a:prstGeom>
+        </p:spPr>
+      </p:pic>
+      <p:pic>
+        <p:nvPicPr>
+          <p:cNvPr id="12" name="Picture 11">
+            <a:extLst>
+              <a:ext uri="{FF2B5EF4-FFF2-40B4-BE49-F238E27FC236}">
+                <a16:creationId xmlns:a16="http://schemas.microsoft.com/office/drawing/2014/main" id="{AEB55DCA-FEE4-44C8-8268-31047A694D89}"/>
+              </a:ext>
+            </a:extLst>
+          </p:cNvPr>
+          <p:cNvPicPr>
+            <a:picLocks noChangeAspect="1"/>
+          </p:cNvPicPr>
+          <p:nvPr/>
+        </p:nvPicPr>
+        <p:blipFill>
+          <a:blip r:embed="rId3"/>
+          <a:stretch>
+            <a:fillRect/>
+          </a:stretch>
+        </p:blipFill>
+        <p:spPr>
+          <a:xfrm>
+            <a:off x="8397617" y="3531124"/>
+            <a:ext cx="2790280" cy="2452064"/>
+          </a:xfrm>
+          <a:prstGeom prst="rect">
+            <a:avLst/>
+          </a:prstGeom>
+        </p:spPr>
+      </p:pic>
+      <p:sp>
+        <p:nvSpPr>
+          <p:cNvPr id="13" name="TextBox 12">
+            <a:extLst>
+              <a:ext uri="{FF2B5EF4-FFF2-40B4-BE49-F238E27FC236}">
+                <a16:creationId xmlns:a16="http://schemas.microsoft.com/office/drawing/2014/main" id="{0040E066-296A-4B36-B7FB-D9BDEC64AF25}"/>
+              </a:ext>
+            </a:extLst>
+          </p:cNvPr>
+          <p:cNvSpPr txBox="1"/>
+          <p:nvPr/>
+        </p:nvSpPr>
+        <p:spPr>
+          <a:xfrm>
+            <a:off x="8397617" y="3049878"/>
+            <a:ext cx="2143664" cy="276999"/>
+          </a:xfrm>
+          <a:prstGeom prst="rect">
+            <a:avLst/>
+          </a:prstGeom>
+          <a:noFill/>
+        </p:spPr>
+        <p:txBody>
+          <a:bodyPr wrap="none" rtlCol="0">
+            <a:spAutoFit/>
+          </a:bodyPr>
+          <a:lstStyle/>
+          <a:p>
+            <a:r>
+              <a:rPr lang="en-US" sz="1200" dirty="0"/>
+              <a:t>Wiring diagram for Limit Switch</a:t>
+            </a:r>
+          </a:p>
+        </p:txBody>
+      </p:sp>
+      <p:sp>
+        <p:nvSpPr>
+          <p:cNvPr id="14" name="TextBox 13">
+            <a:extLst>
+              <a:ext uri="{FF2B5EF4-FFF2-40B4-BE49-F238E27FC236}">
+                <a16:creationId xmlns:a16="http://schemas.microsoft.com/office/drawing/2014/main" id="{44562DC1-7140-49C2-9221-059AB89D0499}"/>
+              </a:ext>
+            </a:extLst>
+          </p:cNvPr>
+          <p:cNvSpPr txBox="1"/>
+          <p:nvPr/>
+        </p:nvSpPr>
+        <p:spPr>
+          <a:xfrm>
+            <a:off x="8507334" y="6077377"/>
+            <a:ext cx="2099293" cy="276999"/>
+          </a:xfrm>
+          <a:prstGeom prst="rect">
+            <a:avLst/>
+          </a:prstGeom>
+          <a:noFill/>
+        </p:spPr>
+        <p:txBody>
+          <a:bodyPr wrap="none" rtlCol="0">
+            <a:spAutoFit/>
+          </a:bodyPr>
+          <a:lstStyle/>
+          <a:p>
+            <a:r>
+              <a:rPr lang="en-US" sz="1200" dirty="0"/>
+              <a:t>Breadboard dimensions in mm</a:t>
+            </a:r>
           </a:p>
         </p:txBody>
       </p:sp>
@@ -9370,6 +11669,587 @@
     <p:extLst>
       <p:ext uri="{BB962C8B-B14F-4D97-AF65-F5344CB8AC3E}">
         <p14:creationId xmlns:p14="http://schemas.microsoft.com/office/powerpoint/2010/main" val="213099455"/>
+      </p:ext>
+    </p:extLst>
+  </p:cSld>
+  <p:clrMapOvr>
+    <a:masterClrMapping/>
+  </p:clrMapOvr>
+</p:sld>
+</file>
+
+<file path=ppt/slides/slide7.xml><?xml version="1.0" encoding="utf-8"?>
+<p:sld xmlns:a="http://schemas.openxmlformats.org/drawingml/2006/main" xmlns:r="http://schemas.openxmlformats.org/officeDocument/2006/relationships" xmlns:p="http://schemas.openxmlformats.org/presentationml/2006/main">
+  <p:cSld>
+    <p:spTree>
+      <p:nvGrpSpPr>
+        <p:cNvPr id="1" name=""/>
+        <p:cNvGrpSpPr/>
+        <p:nvPr/>
+      </p:nvGrpSpPr>
+      <p:grpSpPr>
+        <a:xfrm>
+          <a:off x="0" y="0"/>
+          <a:ext cx="0" cy="0"/>
+          <a:chOff x="0" y="0"/>
+          <a:chExt cx="0" cy="0"/>
+        </a:xfrm>
+      </p:grpSpPr>
+      <p:grpSp>
+        <p:nvGrpSpPr>
+          <p:cNvPr id="6" name="Group 5">
+            <a:extLst>
+              <a:ext uri="{FF2B5EF4-FFF2-40B4-BE49-F238E27FC236}">
+                <a16:creationId xmlns:a16="http://schemas.microsoft.com/office/drawing/2014/main" id="{B04F0BF3-A5D6-4CB7-A7FD-DD16AB5CDA4A}"/>
+              </a:ext>
+            </a:extLst>
+          </p:cNvPr>
+          <p:cNvGrpSpPr/>
+          <p:nvPr/>
+        </p:nvGrpSpPr>
+        <p:grpSpPr>
+          <a:xfrm>
+            <a:off x="5255414" y="1027906"/>
+            <a:ext cx="6652668" cy="5262465"/>
+            <a:chOff x="5095783" y="1194935"/>
+            <a:chExt cx="6652668" cy="5262465"/>
+          </a:xfrm>
+        </p:grpSpPr>
+        <p:pic>
+          <p:nvPicPr>
+            <p:cNvPr id="1026" name="Picture 2" descr="Arduino Uno Rev3 | Arduino Official Store">
+              <a:extLst>
+                <a:ext uri="{FF2B5EF4-FFF2-40B4-BE49-F238E27FC236}">
+                  <a16:creationId xmlns:a16="http://schemas.microsoft.com/office/drawing/2014/main" id="{AA6A078B-CFC7-4D4B-AD83-6620D8E3D169}"/>
+                </a:ext>
+              </a:extLst>
+            </p:cNvPr>
+            <p:cNvPicPr>
+              <a:picLocks noChangeAspect="1" noChangeArrowheads="1"/>
+            </p:cNvPicPr>
+            <p:nvPr/>
+          </p:nvPicPr>
+          <p:blipFill>
+            <a:blip r:embed="rId2">
+              <a:extLst>
+                <a:ext uri="{28A0092B-C50C-407E-A947-70E740481C1C}">
+                  <a14:useLocalDpi xmlns:a14="http://schemas.microsoft.com/office/drawing/2010/main" val="0"/>
+                </a:ext>
+              </a:extLst>
+            </a:blip>
+            <a:srcRect/>
+            <a:stretch>
+              <a:fillRect/>
+            </a:stretch>
+          </p:blipFill>
+          <p:spPr bwMode="auto">
+            <a:xfrm>
+              <a:off x="6093771" y="1194935"/>
+              <a:ext cx="5260029" cy="5262465"/>
+            </a:xfrm>
+            <a:prstGeom prst="rect">
+              <a:avLst/>
+            </a:prstGeom>
+            <a:noFill/>
+            <a:extLst>
+              <a:ext uri="{909E8E84-426E-40DD-AFC4-6F175D3DCCD1}">
+                <a14:hiddenFill xmlns:a14="http://schemas.microsoft.com/office/drawing/2010/main">
+                  <a:solidFill>
+                    <a:srgbClr val="FFFFFF"/>
+                  </a:solidFill>
+                </a14:hiddenFill>
+              </a:ext>
+            </a:extLst>
+          </p:spPr>
+        </p:pic>
+        <p:sp>
+          <p:nvSpPr>
+            <p:cNvPr id="5" name="Rectangle 4">
+              <a:extLst>
+                <a:ext uri="{FF2B5EF4-FFF2-40B4-BE49-F238E27FC236}">
+                  <a16:creationId xmlns:a16="http://schemas.microsoft.com/office/drawing/2014/main" id="{7279C41F-AEAE-41DE-85D7-E937A35FF147}"/>
+                </a:ext>
+              </a:extLst>
+            </p:cNvPr>
+            <p:cNvSpPr/>
+            <p:nvPr/>
+          </p:nvSpPr>
+          <p:spPr>
+            <a:xfrm>
+              <a:off x="5095783" y="4491466"/>
+              <a:ext cx="2254928" cy="240331"/>
+            </a:xfrm>
+            <a:prstGeom prst="rect">
+              <a:avLst/>
+            </a:prstGeom>
+            <a:solidFill>
+              <a:srgbClr val="3016F2">
+                <a:alpha val="27843"/>
+              </a:srgbClr>
+            </a:solidFill>
+            <a:ln>
+              <a:noFill/>
+            </a:ln>
+          </p:spPr>
+          <p:style>
+            <a:lnRef idx="2">
+              <a:schemeClr val="accent1">
+                <a:shade val="50000"/>
+              </a:schemeClr>
+            </a:lnRef>
+            <a:fillRef idx="1">
+              <a:schemeClr val="accent1"/>
+            </a:fillRef>
+            <a:effectRef idx="0">
+              <a:schemeClr val="accent1"/>
+            </a:effectRef>
+            <a:fontRef idx="minor">
+              <a:schemeClr val="lt1"/>
+            </a:fontRef>
+          </p:style>
+          <p:txBody>
+            <a:bodyPr rtlCol="0" anchor="ctr"/>
+            <a:lstStyle/>
+            <a:p>
+              <a:r>
+                <a:rPr lang="en-US" dirty="0"/>
+                <a:t>LIMIT</a:t>
+              </a:r>
+            </a:p>
+          </p:txBody>
+        </p:sp>
+        <p:sp>
+          <p:nvSpPr>
+            <p:cNvPr id="7" name="Rectangle 6">
+              <a:extLst>
+                <a:ext uri="{FF2B5EF4-FFF2-40B4-BE49-F238E27FC236}">
+                  <a16:creationId xmlns:a16="http://schemas.microsoft.com/office/drawing/2014/main" id="{3756186C-F2EF-4F91-8090-8D25D70A6731}"/>
+                </a:ext>
+              </a:extLst>
+            </p:cNvPr>
+            <p:cNvSpPr/>
+            <p:nvPr/>
+          </p:nvSpPr>
+          <p:spPr>
+            <a:xfrm>
+              <a:off x="10170830" y="4279037"/>
+              <a:ext cx="1565449" cy="115410"/>
+            </a:xfrm>
+            <a:prstGeom prst="rect">
+              <a:avLst/>
+            </a:prstGeom>
+            <a:solidFill>
+              <a:srgbClr val="3016F2">
+                <a:alpha val="27843"/>
+              </a:srgbClr>
+            </a:solidFill>
+            <a:ln>
+              <a:noFill/>
+            </a:ln>
+          </p:spPr>
+          <p:style>
+            <a:lnRef idx="2">
+              <a:schemeClr val="accent1">
+                <a:shade val="50000"/>
+              </a:schemeClr>
+            </a:lnRef>
+            <a:fillRef idx="1">
+              <a:schemeClr val="accent1"/>
+            </a:fillRef>
+            <a:effectRef idx="0">
+              <a:schemeClr val="accent1"/>
+            </a:effectRef>
+            <a:fontRef idx="minor">
+              <a:schemeClr val="lt1"/>
+            </a:fontRef>
+          </p:style>
+          <p:txBody>
+            <a:bodyPr rtlCol="0" anchor="ctr"/>
+            <a:lstStyle/>
+            <a:p>
+              <a:pPr algn="r"/>
+              <a:r>
+                <a:rPr lang="en-US" sz="1100" dirty="0"/>
+                <a:t>LIMIT</a:t>
+              </a:r>
+            </a:p>
+          </p:txBody>
+        </p:sp>
+        <p:sp>
+          <p:nvSpPr>
+            <p:cNvPr id="8" name="Rectangle 7">
+              <a:extLst>
+                <a:ext uri="{FF2B5EF4-FFF2-40B4-BE49-F238E27FC236}">
+                  <a16:creationId xmlns:a16="http://schemas.microsoft.com/office/drawing/2014/main" id="{21533B4D-AE19-491E-BD1A-D2DD70866DDB}"/>
+                </a:ext>
+              </a:extLst>
+            </p:cNvPr>
+            <p:cNvSpPr/>
+            <p:nvPr/>
+          </p:nvSpPr>
+          <p:spPr>
+            <a:xfrm>
+              <a:off x="5096283" y="4154750"/>
+              <a:ext cx="2253294" cy="336716"/>
+            </a:xfrm>
+            <a:prstGeom prst="rect">
+              <a:avLst/>
+            </a:prstGeom>
+            <a:solidFill>
+              <a:srgbClr val="009E40">
+                <a:alpha val="27451"/>
+              </a:srgbClr>
+            </a:solidFill>
+            <a:ln>
+              <a:noFill/>
+            </a:ln>
+          </p:spPr>
+          <p:style>
+            <a:lnRef idx="2">
+              <a:schemeClr val="accent1">
+                <a:shade val="50000"/>
+              </a:schemeClr>
+            </a:lnRef>
+            <a:fillRef idx="1">
+              <a:schemeClr val="accent1"/>
+            </a:fillRef>
+            <a:effectRef idx="0">
+              <a:schemeClr val="accent1"/>
+            </a:effectRef>
+            <a:fontRef idx="minor">
+              <a:schemeClr val="lt1"/>
+            </a:fontRef>
+          </p:style>
+          <p:txBody>
+            <a:bodyPr rtlCol="0" anchor="ctr"/>
+            <a:lstStyle/>
+            <a:p>
+              <a:r>
+                <a:rPr lang="en-US" dirty="0"/>
+                <a:t>RGB LED</a:t>
+              </a:r>
+            </a:p>
+          </p:txBody>
+        </p:sp>
+        <p:sp>
+          <p:nvSpPr>
+            <p:cNvPr id="9" name="Rectangle 8">
+              <a:extLst>
+                <a:ext uri="{FF2B5EF4-FFF2-40B4-BE49-F238E27FC236}">
+                  <a16:creationId xmlns:a16="http://schemas.microsoft.com/office/drawing/2014/main" id="{4B5A7192-514F-4B09-A0A2-B5423F9AD42F}"/>
+                </a:ext>
+              </a:extLst>
+            </p:cNvPr>
+            <p:cNvSpPr/>
+            <p:nvPr/>
+          </p:nvSpPr>
+          <p:spPr>
+            <a:xfrm>
+              <a:off x="10183002" y="4163627"/>
+              <a:ext cx="1565449" cy="115410"/>
+            </a:xfrm>
+            <a:prstGeom prst="rect">
+              <a:avLst/>
+            </a:prstGeom>
+            <a:solidFill>
+              <a:srgbClr val="F81010">
+                <a:alpha val="27843"/>
+              </a:srgbClr>
+            </a:solidFill>
+            <a:ln>
+              <a:noFill/>
+            </a:ln>
+          </p:spPr>
+          <p:style>
+            <a:lnRef idx="2">
+              <a:schemeClr val="accent1">
+                <a:shade val="50000"/>
+              </a:schemeClr>
+            </a:lnRef>
+            <a:fillRef idx="1">
+              <a:schemeClr val="accent1"/>
+            </a:fillRef>
+            <a:effectRef idx="0">
+              <a:schemeClr val="accent1"/>
+            </a:effectRef>
+            <a:fontRef idx="minor">
+              <a:schemeClr val="lt1"/>
+            </a:fontRef>
+          </p:style>
+          <p:txBody>
+            <a:bodyPr rtlCol="0" anchor="ctr"/>
+            <a:lstStyle/>
+            <a:p>
+              <a:pPr algn="r"/>
+              <a:r>
+                <a:rPr lang="en-US" sz="1100" dirty="0"/>
+                <a:t>SOLENOID</a:t>
+              </a:r>
+            </a:p>
+          </p:txBody>
+        </p:sp>
+        <p:sp>
+          <p:nvSpPr>
+            <p:cNvPr id="10" name="Rectangle 9">
+              <a:extLst>
+                <a:ext uri="{FF2B5EF4-FFF2-40B4-BE49-F238E27FC236}">
+                  <a16:creationId xmlns:a16="http://schemas.microsoft.com/office/drawing/2014/main" id="{71BE7BB7-7C42-4335-9E7C-ACAF61F85FF0}"/>
+                </a:ext>
+              </a:extLst>
+            </p:cNvPr>
+            <p:cNvSpPr/>
+            <p:nvPr/>
+          </p:nvSpPr>
+          <p:spPr>
+            <a:xfrm>
+              <a:off x="10183002" y="3826167"/>
+              <a:ext cx="1565449" cy="222050"/>
+            </a:xfrm>
+            <a:prstGeom prst="rect">
+              <a:avLst/>
+            </a:prstGeom>
+            <a:solidFill>
+              <a:srgbClr val="F81010">
+                <a:alpha val="27843"/>
+              </a:srgbClr>
+            </a:solidFill>
+            <a:ln>
+              <a:noFill/>
+            </a:ln>
+          </p:spPr>
+          <p:style>
+            <a:lnRef idx="2">
+              <a:schemeClr val="accent1">
+                <a:shade val="50000"/>
+              </a:schemeClr>
+            </a:lnRef>
+            <a:fillRef idx="1">
+              <a:schemeClr val="accent1"/>
+            </a:fillRef>
+            <a:effectRef idx="0">
+              <a:schemeClr val="accent1"/>
+            </a:effectRef>
+            <a:fontRef idx="minor">
+              <a:schemeClr val="lt1"/>
+            </a:fontRef>
+          </p:style>
+          <p:txBody>
+            <a:bodyPr rtlCol="0" anchor="ctr"/>
+            <a:lstStyle/>
+            <a:p>
+              <a:pPr algn="r"/>
+              <a:r>
+                <a:rPr lang="en-US" sz="1600" dirty="0"/>
+                <a:t>Solenoid</a:t>
+              </a:r>
+            </a:p>
+          </p:txBody>
+        </p:sp>
+      </p:grpSp>
+      <p:sp>
+        <p:nvSpPr>
+          <p:cNvPr id="12" name="Content Placeholder 2">
+            <a:extLst>
+              <a:ext uri="{FF2B5EF4-FFF2-40B4-BE49-F238E27FC236}">
+                <a16:creationId xmlns:a16="http://schemas.microsoft.com/office/drawing/2014/main" id="{15C09DF4-7B9B-4BA1-AA79-A46313C15D24}"/>
+              </a:ext>
+            </a:extLst>
+          </p:cNvPr>
+          <p:cNvSpPr>
+            <a:spLocks noGrp="1"/>
+          </p:cNvSpPr>
+          <p:nvPr>
+            <p:ph sz="half" idx="1"/>
+          </p:nvPr>
+        </p:nvSpPr>
+        <p:spPr>
+          <a:xfrm>
+            <a:off x="838200" y="1825625"/>
+            <a:ext cx="4230950" cy="4667250"/>
+          </a:xfrm>
+        </p:spPr>
+        <p:txBody>
+          <a:bodyPr>
+            <a:normAutofit fontScale="62500" lnSpcReduction="20000"/>
+          </a:bodyPr>
+          <a:lstStyle/>
+          <a:p>
+            <a:r>
+              <a:rPr lang="en-US" dirty="0"/>
+              <a:t>Place the X-</a:t>
+            </a:r>
+            <a:r>
+              <a:rPr lang="en-US" dirty="0" err="1"/>
+              <a:t>Nucleo</a:t>
+            </a:r>
+            <a:r>
+              <a:rPr lang="en-US" dirty="0"/>
+              <a:t> </a:t>
+            </a:r>
+            <a:r>
+              <a:rPr lang="en-US" dirty="0" err="1"/>
+              <a:t>ontop</a:t>
+            </a:r>
+            <a:r>
+              <a:rPr lang="en-US" dirty="0"/>
+              <a:t> of the Arduino Uno. </a:t>
+            </a:r>
+          </a:p>
+          <a:p>
+            <a:pPr lvl="1"/>
+            <a:r>
+              <a:rPr lang="en-US" i="1" dirty="0">
+                <a:solidFill>
+                  <a:schemeClr val="bg2">
+                    <a:lumMod val="50000"/>
+                  </a:schemeClr>
+                </a:solidFill>
+              </a:rPr>
+              <a:t>Pin spacing is the same for </a:t>
+            </a:r>
+            <a:r>
+              <a:rPr lang="en-US" i="1" dirty="0" err="1">
+                <a:solidFill>
+                  <a:schemeClr val="bg2">
+                    <a:lumMod val="50000"/>
+                  </a:schemeClr>
+                </a:solidFill>
+              </a:rPr>
+              <a:t>Nucleo</a:t>
+            </a:r>
+            <a:r>
+              <a:rPr lang="en-US" i="1" dirty="0">
+                <a:solidFill>
+                  <a:schemeClr val="bg2">
+                    <a:lumMod val="50000"/>
+                  </a:schemeClr>
+                </a:solidFill>
+              </a:rPr>
+              <a:t> and Arduino Uno. </a:t>
+            </a:r>
+          </a:p>
+          <a:p>
+            <a:r>
+              <a:rPr lang="en-US" dirty="0"/>
+              <a:t>3 Wires are reserved for the limit switch (A4, A5, D3). </a:t>
+            </a:r>
+          </a:p>
+          <a:p>
+            <a:r>
+              <a:rPr lang="en-US" dirty="0"/>
+              <a:t>3 Wires are reserved for the inlet RGB LED (A1, A2, A3)</a:t>
+            </a:r>
+          </a:p>
+          <a:p>
+            <a:r>
+              <a:rPr lang="en-US" dirty="0"/>
+              <a:t>3 Wires are reserved for the Solenoid (D4, D6, &amp; D7)</a:t>
+            </a:r>
+          </a:p>
+          <a:p>
+            <a:r>
+              <a:rPr lang="en-US" dirty="0"/>
+              <a:t>Wire the stepper motor to the </a:t>
+            </a:r>
+            <a:r>
+              <a:rPr lang="en-US" dirty="0" err="1"/>
+              <a:t>Nucleo</a:t>
+            </a:r>
+            <a:r>
+              <a:rPr lang="en-US" dirty="0"/>
+              <a:t> output screw terminals (A+/A-, B+/B-). </a:t>
+            </a:r>
+          </a:p>
+          <a:p>
+            <a:pPr lvl="1"/>
+            <a:r>
+              <a:rPr lang="en-US" dirty="0"/>
+              <a:t>Each coil of the stepper motor is indicated by A or B. Identify which leads correspond to the same coil using an Ohm meter.</a:t>
+            </a:r>
+          </a:p>
+          <a:p>
+            <a:r>
+              <a:rPr lang="en-US" dirty="0"/>
+              <a:t>Connect the 12 V power supply to the </a:t>
+            </a:r>
+            <a:r>
+              <a:rPr lang="en-US" dirty="0" err="1"/>
+              <a:t>Nucleo</a:t>
+            </a:r>
+            <a:r>
+              <a:rPr lang="en-US" dirty="0"/>
+              <a:t> power screw terminals (Labeled GND and +V).</a:t>
+            </a:r>
+          </a:p>
+        </p:txBody>
+      </p:sp>
+      <p:sp>
+        <p:nvSpPr>
+          <p:cNvPr id="2" name="Title 1">
+            <a:extLst>
+              <a:ext uri="{FF2B5EF4-FFF2-40B4-BE49-F238E27FC236}">
+                <a16:creationId xmlns:a16="http://schemas.microsoft.com/office/drawing/2014/main" id="{E6AFBFAF-9B0D-4924-BAE7-409F28866056}"/>
+              </a:ext>
+            </a:extLst>
+          </p:cNvPr>
+          <p:cNvSpPr>
+            <a:spLocks noGrp="1"/>
+          </p:cNvSpPr>
+          <p:nvPr>
+            <p:ph type="title"/>
+          </p:nvPr>
+        </p:nvSpPr>
+        <p:spPr/>
+        <p:txBody>
+          <a:bodyPr/>
+          <a:lstStyle/>
+          <a:p>
+            <a:r>
+              <a:rPr lang="en-US" dirty="0"/>
+              <a:t>Outlet Arduino Pin Assignments</a:t>
+            </a:r>
+          </a:p>
+        </p:txBody>
+      </p:sp>
+      <p:sp>
+        <p:nvSpPr>
+          <p:cNvPr id="14" name="TextBox 13">
+            <a:extLst>
+              <a:ext uri="{FF2B5EF4-FFF2-40B4-BE49-F238E27FC236}">
+                <a16:creationId xmlns:a16="http://schemas.microsoft.com/office/drawing/2014/main" id="{4B1C2A8E-3C86-47CA-A61C-4E9540B94E1F}"/>
+              </a:ext>
+            </a:extLst>
+          </p:cNvPr>
+          <p:cNvSpPr txBox="1"/>
+          <p:nvPr/>
+        </p:nvSpPr>
+        <p:spPr>
+          <a:xfrm>
+            <a:off x="6181077" y="6252138"/>
+            <a:ext cx="6094520" cy="369332"/>
+          </a:xfrm>
+          <a:prstGeom prst="rect">
+            <a:avLst/>
+          </a:prstGeom>
+          <a:noFill/>
+        </p:spPr>
+        <p:txBody>
+          <a:bodyPr wrap="square">
+            <a:spAutoFit/>
+          </a:bodyPr>
+          <a:lstStyle/>
+          <a:p>
+            <a:r>
+              <a:rPr lang="en-US" dirty="0"/>
+              <a:t>https://store.arduino.cc/usa/arduino-uno-rev3</a:t>
+            </a:r>
+          </a:p>
+        </p:txBody>
+      </p:sp>
+    </p:spTree>
+    <p:extLst>
+      <p:ext uri="{BB962C8B-B14F-4D97-AF65-F5344CB8AC3E}">
+        <p14:creationId xmlns:p14="http://schemas.microsoft.com/office/powerpoint/2010/main" val="4217647582"/>
       </p:ext>
     </p:extLst>
   </p:cSld>
@@ -9692,4 +12572,299 @@
     </a:ext>
   </a:extLst>
 </a:theme>
+</file>
+
+<file path=ppt/theme/theme2.xml><?xml version="1.0" encoding="utf-8"?>
+<a:theme xmlns:a="http://schemas.openxmlformats.org/drawingml/2006/main" name="Office Theme">
+  <a:themeElements>
+    <a:clrScheme name="Office">
+      <a:dk1>
+        <a:sysClr val="windowText" lastClr="000000"/>
+      </a:dk1>
+      <a:lt1>
+        <a:sysClr val="window" lastClr="FFFFFF"/>
+      </a:lt1>
+      <a:dk2>
+        <a:srgbClr val="44546A"/>
+      </a:dk2>
+      <a:lt2>
+        <a:srgbClr val="E7E6E6"/>
+      </a:lt2>
+      <a:accent1>
+        <a:srgbClr val="4472C4"/>
+      </a:accent1>
+      <a:accent2>
+        <a:srgbClr val="ED7D31"/>
+      </a:accent2>
+      <a:accent3>
+        <a:srgbClr val="A5A5A5"/>
+      </a:accent3>
+      <a:accent4>
+        <a:srgbClr val="FFC000"/>
+      </a:accent4>
+      <a:accent5>
+        <a:srgbClr val="5B9BD5"/>
+      </a:accent5>
+      <a:accent6>
+        <a:srgbClr val="70AD47"/>
+      </a:accent6>
+      <a:hlink>
+        <a:srgbClr val="0563C1"/>
+      </a:hlink>
+      <a:folHlink>
+        <a:srgbClr val="954F72"/>
+      </a:folHlink>
+    </a:clrScheme>
+    <a:fontScheme name="Office">
+      <a:majorFont>
+        <a:latin typeface="Calibri Light" panose="020F0302020204030204"/>
+        <a:ea typeface=""/>
+        <a:cs typeface=""/>
+        <a:font script="Jpan" typeface="游ゴシック Light"/>
+        <a:font script="Hang" typeface="맑은 고딕"/>
+        <a:font script="Hans" typeface="等线 Light"/>
+        <a:font script="Hant" typeface="新細明體"/>
+        <a:font script="Arab" typeface="Times New Roman"/>
+        <a:font script="Hebr" typeface="Times New Roman"/>
+        <a:font script="Thai" typeface="Angsana New"/>
+        <a:font script="Ethi" typeface="Nyala"/>
+        <a:font script="Beng" typeface="Vrinda"/>
+        <a:font script="Gujr" typeface="Shruti"/>
+        <a:font script="Khmr" typeface="MoolBoran"/>
+        <a:font script="Knda" typeface="Tunga"/>
+        <a:font script="Guru" typeface="Raavi"/>
+        <a:font script="Cans" typeface="Euphemia"/>
+        <a:font script="Cher" typeface="Plantagenet Cherokee"/>
+        <a:font script="Yiii" typeface="Microsoft Yi Baiti"/>
+        <a:font script="Tibt" typeface="Microsoft Himalaya"/>
+        <a:font script="Thaa" typeface="MV Boli"/>
+        <a:font script="Deva" typeface="Mangal"/>
+        <a:font script="Telu" typeface="Gautami"/>
+        <a:font script="Taml" typeface="Latha"/>
+        <a:font script="Syrc" typeface="Estrangelo Edessa"/>
+        <a:font script="Orya" typeface="Kalinga"/>
+        <a:font script="Mlym" typeface="Kartika"/>
+        <a:font script="Laoo" typeface="DokChampa"/>
+        <a:font script="Sinh" typeface="Iskoola Pota"/>
+        <a:font script="Mong" typeface="Mongolian Baiti"/>
+        <a:font script="Viet" typeface="Times New Roman"/>
+        <a:font script="Uigh" typeface="Microsoft Uighur"/>
+        <a:font script="Geor" typeface="Sylfaen"/>
+        <a:font script="Armn" typeface="Arial"/>
+        <a:font script="Bugi" typeface="Leelawadee UI"/>
+        <a:font script="Bopo" typeface="Microsoft JhengHei"/>
+        <a:font script="Java" typeface="Javanese Text"/>
+        <a:font script="Lisu" typeface="Segoe UI"/>
+        <a:font script="Mymr" typeface="Myanmar Text"/>
+        <a:font script="Nkoo" typeface="Ebrima"/>
+        <a:font script="Olck" typeface="Nirmala UI"/>
+        <a:font script="Osma" typeface="Ebrima"/>
+        <a:font script="Phag" typeface="Phagspa"/>
+        <a:font script="Syrn" typeface="Estrangelo Edessa"/>
+        <a:font script="Syrj" typeface="Estrangelo Edessa"/>
+        <a:font script="Syre" typeface="Estrangelo Edessa"/>
+        <a:font script="Sora" typeface="Nirmala UI"/>
+        <a:font script="Tale" typeface="Microsoft Tai Le"/>
+        <a:font script="Talu" typeface="Microsoft New Tai Lue"/>
+        <a:font script="Tfng" typeface="Ebrima"/>
+      </a:majorFont>
+      <a:minorFont>
+        <a:latin typeface="Calibri" panose="020F0502020204030204"/>
+        <a:ea typeface=""/>
+        <a:cs typeface=""/>
+        <a:font script="Jpan" typeface="游ゴシック"/>
+        <a:font script="Hang" typeface="맑은 고딕"/>
+        <a:font script="Hans" typeface="等线"/>
+        <a:font script="Hant" typeface="新細明體"/>
+        <a:font script="Arab" typeface="Arial"/>
+        <a:font script="Hebr" typeface="Arial"/>
+        <a:font script="Thai" typeface="Cordia New"/>
+        <a:font script="Ethi" typeface="Nyala"/>
+        <a:font script="Beng" typeface="Vrinda"/>
+        <a:font script="Gujr" typeface="Shruti"/>
+        <a:font script="Khmr" typeface="DaunPenh"/>
+        <a:font script="Knda" typeface="Tunga"/>
+        <a:font script="Guru" typeface="Raavi"/>
+        <a:font script="Cans" typeface="Euphemia"/>
+        <a:font script="Cher" typeface="Plantagenet Cherokee"/>
+        <a:font script="Yiii" typeface="Microsoft Yi Baiti"/>
+        <a:font script="Tibt" typeface="Microsoft Himalaya"/>
+        <a:font script="Thaa" typeface="MV Boli"/>
+        <a:font script="Deva" typeface="Mangal"/>
+        <a:font script="Telu" typeface="Gautami"/>
+        <a:font script="Taml" typeface="Latha"/>
+        <a:font script="Syrc" typeface="Estrangelo Edessa"/>
+        <a:font script="Orya" typeface="Kalinga"/>
+        <a:font script="Mlym" typeface="Kartika"/>
+        <a:font script="Laoo" typeface="DokChampa"/>
+        <a:font script="Sinh" typeface="Iskoola Pota"/>
+        <a:font script="Mong" typeface="Mongolian Baiti"/>
+        <a:font script="Viet" typeface="Arial"/>
+        <a:font script="Uigh" typeface="Microsoft Uighur"/>
+        <a:font script="Geor" typeface="Sylfaen"/>
+        <a:font script="Armn" typeface="Arial"/>
+        <a:font script="Bugi" typeface="Leelawadee UI"/>
+        <a:font script="Bopo" typeface="Microsoft JhengHei"/>
+        <a:font script="Java" typeface="Javanese Text"/>
+        <a:font script="Lisu" typeface="Segoe UI"/>
+        <a:font script="Mymr" typeface="Myanmar Text"/>
+        <a:font script="Nkoo" typeface="Ebrima"/>
+        <a:font script="Olck" typeface="Nirmala UI"/>
+        <a:font script="Osma" typeface="Ebrima"/>
+        <a:font script="Phag" typeface="Phagspa"/>
+        <a:font script="Syrn" typeface="Estrangelo Edessa"/>
+        <a:font script="Syrj" typeface="Estrangelo Edessa"/>
+        <a:font script="Syre" typeface="Estrangelo Edessa"/>
+        <a:font script="Sora" typeface="Nirmala UI"/>
+        <a:font script="Tale" typeface="Microsoft Tai Le"/>
+        <a:font script="Talu" typeface="Microsoft New Tai Lue"/>
+        <a:font script="Tfng" typeface="Ebrima"/>
+      </a:minorFont>
+    </a:fontScheme>
+    <a:fmtScheme name="Office">
+      <a:fillStyleLst>
+        <a:solidFill>
+          <a:schemeClr val="phClr"/>
+        </a:solidFill>
+        <a:gradFill rotWithShape="1">
+          <a:gsLst>
+            <a:gs pos="0">
+              <a:schemeClr val="phClr">
+                <a:lumMod val="110000"/>
+                <a:satMod val="105000"/>
+                <a:tint val="67000"/>
+              </a:schemeClr>
+            </a:gs>
+            <a:gs pos="50000">
+              <a:schemeClr val="phClr">
+                <a:lumMod val="105000"/>
+                <a:satMod val="103000"/>
+                <a:tint val="73000"/>
+              </a:schemeClr>
+            </a:gs>
+            <a:gs pos="100000">
+              <a:schemeClr val="phClr">
+                <a:lumMod val="105000"/>
+                <a:satMod val="109000"/>
+                <a:tint val="81000"/>
+              </a:schemeClr>
+            </a:gs>
+          </a:gsLst>
+          <a:lin ang="5400000" scaled="0"/>
+        </a:gradFill>
+        <a:gradFill rotWithShape="1">
+          <a:gsLst>
+            <a:gs pos="0">
+              <a:schemeClr val="phClr">
+                <a:satMod val="103000"/>
+                <a:lumMod val="102000"/>
+                <a:tint val="94000"/>
+              </a:schemeClr>
+            </a:gs>
+            <a:gs pos="50000">
+              <a:schemeClr val="phClr">
+                <a:satMod val="110000"/>
+                <a:lumMod val="100000"/>
+                <a:shade val="100000"/>
+              </a:schemeClr>
+            </a:gs>
+            <a:gs pos="100000">
+              <a:schemeClr val="phClr">
+                <a:lumMod val="99000"/>
+                <a:satMod val="120000"/>
+                <a:shade val="78000"/>
+              </a:schemeClr>
+            </a:gs>
+          </a:gsLst>
+          <a:lin ang="5400000" scaled="0"/>
+        </a:gradFill>
+      </a:fillStyleLst>
+      <a:lnStyleLst>
+        <a:ln w="6350" cap="flat" cmpd="sng" algn="ctr">
+          <a:solidFill>
+            <a:schemeClr val="phClr"/>
+          </a:solidFill>
+          <a:prstDash val="solid"/>
+          <a:miter lim="800000"/>
+        </a:ln>
+        <a:ln w="12700" cap="flat" cmpd="sng" algn="ctr">
+          <a:solidFill>
+            <a:schemeClr val="phClr"/>
+          </a:solidFill>
+          <a:prstDash val="solid"/>
+          <a:miter lim="800000"/>
+        </a:ln>
+        <a:ln w="19050" cap="flat" cmpd="sng" algn="ctr">
+          <a:solidFill>
+            <a:schemeClr val="phClr"/>
+          </a:solidFill>
+          <a:prstDash val="solid"/>
+          <a:miter lim="800000"/>
+        </a:ln>
+      </a:lnStyleLst>
+      <a:effectStyleLst>
+        <a:effectStyle>
+          <a:effectLst/>
+        </a:effectStyle>
+        <a:effectStyle>
+          <a:effectLst/>
+        </a:effectStyle>
+        <a:effectStyle>
+          <a:effectLst>
+            <a:outerShdw blurRad="57150" dist="19050" dir="5400000" algn="ctr" rotWithShape="0">
+              <a:srgbClr val="000000">
+                <a:alpha val="63000"/>
+              </a:srgbClr>
+            </a:outerShdw>
+          </a:effectLst>
+        </a:effectStyle>
+      </a:effectStyleLst>
+      <a:bgFillStyleLst>
+        <a:solidFill>
+          <a:schemeClr val="phClr"/>
+        </a:solidFill>
+        <a:solidFill>
+          <a:schemeClr val="phClr">
+            <a:tint val="95000"/>
+            <a:satMod val="170000"/>
+          </a:schemeClr>
+        </a:solidFill>
+        <a:gradFill rotWithShape="1">
+          <a:gsLst>
+            <a:gs pos="0">
+              <a:schemeClr val="phClr">
+                <a:tint val="93000"/>
+                <a:satMod val="150000"/>
+                <a:shade val="98000"/>
+                <a:lumMod val="102000"/>
+              </a:schemeClr>
+            </a:gs>
+            <a:gs pos="50000">
+              <a:schemeClr val="phClr">
+                <a:tint val="98000"/>
+                <a:satMod val="130000"/>
+                <a:shade val="90000"/>
+                <a:lumMod val="103000"/>
+              </a:schemeClr>
+            </a:gs>
+            <a:gs pos="100000">
+              <a:schemeClr val="phClr">
+                <a:shade val="63000"/>
+                <a:satMod val="120000"/>
+              </a:schemeClr>
+            </a:gs>
+          </a:gsLst>
+          <a:lin ang="5400000" scaled="0"/>
+        </a:gradFill>
+      </a:bgFillStyleLst>
+    </a:fmtScheme>
+  </a:themeElements>
+  <a:objectDefaults/>
+  <a:extraClrSchemeLst/>
+  <a:extLst>
+    <a:ext uri="{05A4C25C-085E-4340-85A3-A5531E510DB2}">
+      <thm15:themeFamily xmlns:thm15="http://schemas.microsoft.com/office/thememl/2012/main" name="Office Theme" id="{62F939B6-93AF-4DB8-9C6B-D6C7DFDC589F}" vid="{4A3C46E8-61CC-4603-A589-7422A47A8E4A}"/>
+    </a:ext>
+  </a:extLst>
+</a:theme>
 </file>
</xml_diff>